<commit_message>
Aktualisierung der Folien zum Teilthema Paging
</commit_message>
<xml_diff>
--- a/DBI Präsentation Gruppe 2 - Teilthema Paging.pptx
+++ b/DBI Präsentation Gruppe 2 - Teilthema Paging.pptx
@@ -5,14 +5,16 @@
     <p:sldMasterId id="2147483648" r:id="rId1"/>
   </p:sldMasterIdLst>
   <p:notesMasterIdLst>
-    <p:notesMasterId r:id="rId7"/>
+    <p:notesMasterId r:id="rId9"/>
   </p:notesMasterIdLst>
   <p:sldIdLst>
     <p:sldId id="256" r:id="rId2"/>
     <p:sldId id="257" r:id="rId3"/>
-    <p:sldId id="258" r:id="rId4"/>
-    <p:sldId id="259" r:id="rId5"/>
-    <p:sldId id="260" r:id="rId6"/>
+    <p:sldId id="261" r:id="rId4"/>
+    <p:sldId id="258" r:id="rId5"/>
+    <p:sldId id="259" r:id="rId6"/>
+    <p:sldId id="260" r:id="rId7"/>
+    <p:sldId id="262" r:id="rId8"/>
   </p:sldIdLst>
   <p:sldSz cx="12192000" cy="6858000"/>
   <p:notesSz cx="6858000" cy="9144000"/>
@@ -201,7 +203,7 @@
           <a:p>
             <a:fld id="{BBA2DBA5-AD2D-4086-B822-F7CC11780B39}" type="datetimeFigureOut">
               <a:rPr lang="en-US" smtClean="0"/>
-              <a:t>11/5/2023</a:t>
+              <a:t>11/6/2023</a:t>
             </a:fld>
             <a:endParaRPr lang="en-US"/>
           </a:p>
@@ -597,1309 +599,6 @@
           <a:bodyPr/>
           <a:lstStyle/>
           <a:p>
-            <a:pPr marL="0" marR="0" lvl="0" indent="0" algn="l" defTabSz="914400" rtl="0" eaLnBrk="1" fontAlgn="auto" latinLnBrk="0" hangingPunct="1">
-              <a:lnSpc>
-                <a:spcPct val="100000"/>
-              </a:lnSpc>
-              <a:spcBef>
-                <a:spcPts val="0"/>
-              </a:spcBef>
-              <a:spcAft>
-                <a:spcPts val="0"/>
-              </a:spcAft>
-              <a:buClrTx/>
-              <a:buSzTx/>
-              <a:buFontTx/>
-              <a:buNone/>
-              <a:tabLst/>
-              <a:defRPr/>
-            </a:pPr>
-            <a:r>
-              <a:rPr lang="de-AT" b="0" i="0" u="none" strike="noStrike" dirty="0">
-                <a:solidFill>
-                  <a:srgbClr val="E8EAED"/>
-                </a:solidFill>
-                <a:effectLst/>
-                <a:latin typeface="Google Sans"/>
-              </a:rPr>
-              <a:t>https://www.it-visions.de/</a:t>
-            </a:r>
-            <a:r>
-              <a:rPr lang="de-AT" b="0" i="0" u="none" strike="noStrike" dirty="0" err="1">
-                <a:solidFill>
-                  <a:srgbClr val="E8EAED"/>
-                </a:solidFill>
-                <a:effectLst/>
-                <a:latin typeface="Google Sans"/>
-              </a:rPr>
-              <a:t>glossar</a:t>
-            </a:r>
-            <a:r>
-              <a:rPr lang="de-AT" b="0" i="0" u="none" strike="noStrike" dirty="0">
-                <a:solidFill>
-                  <a:srgbClr val="E8EAED"/>
-                </a:solidFill>
-                <a:effectLst/>
-                <a:latin typeface="Google Sans"/>
-              </a:rPr>
-              <a:t>/alle/8380/Paging.aspx#:~:</a:t>
-            </a:r>
-            <a:r>
-              <a:rPr lang="de-AT" b="0" i="0" u="none" strike="noStrike" dirty="0" err="1">
-                <a:solidFill>
-                  <a:srgbClr val="E8EAED"/>
-                </a:solidFill>
-                <a:effectLst/>
-                <a:latin typeface="Google Sans"/>
-              </a:rPr>
-              <a:t>text</a:t>
-            </a:r>
-            <a:r>
-              <a:rPr lang="de-AT" b="0" i="0" u="none" strike="noStrike" dirty="0">
-                <a:solidFill>
-                  <a:srgbClr val="E8EAED"/>
-                </a:solidFill>
-                <a:effectLst/>
-                <a:latin typeface="Google Sans"/>
-              </a:rPr>
-              <a:t>=Paging%20auf%20Datenbankebene%20bedeutet%2C%20nicht,bis%201100%20von%20200.000%20Datensätzen.</a:t>
-            </a:r>
-            <a:endParaRPr lang="de-AT" dirty="0"/>
-          </a:p>
-          <a:p>
-            <a:endParaRPr lang="de-AT" dirty="0"/>
-          </a:p>
-          <a:p>
-            <a:r>
-              <a:rPr lang="de-AT" dirty="0"/>
-              <a:t>Begriffsdefinition:</a:t>
-            </a:r>
-          </a:p>
-          <a:p>
-            <a:r>
-              <a:rPr lang="de-DE" b="0" i="0" u="none" strike="noStrike" dirty="0" err="1">
-                <a:solidFill>
-                  <a:srgbClr val="E8EAED"/>
-                </a:solidFill>
-                <a:effectLst/>
-                <a:latin typeface="Google Sans"/>
-              </a:rPr>
-              <a:t>Paging</a:t>
-            </a:r>
-            <a:r>
-              <a:rPr lang="de-DE" b="0" i="0" u="none" strike="noStrike" dirty="0">
-                <a:solidFill>
-                  <a:srgbClr val="E8EAED"/>
-                </a:solidFill>
-                <a:effectLst/>
-                <a:latin typeface="Google Sans"/>
-              </a:rPr>
-              <a:t> auf Datenbankebene bedeutet, </a:t>
-            </a:r>
-            <a:r>
-              <a:rPr lang="de-DE" b="0" i="0" u="none" strike="noStrike" dirty="0">
-                <a:solidFill>
-                  <a:srgbClr val="E2EEFF"/>
-                </a:solidFill>
-                <a:effectLst/>
-                <a:latin typeface="Google Sans"/>
-              </a:rPr>
-              <a:t>nicht eine gesamte Datenmenge vom Datenbankmanagementsystem abzuholen, sondern aus einer Ergebnismenge nur eine Teilmenge anhand der Position in der Ergebnismenge</a:t>
-            </a:r>
-            <a:r>
-              <a:rPr lang="de-DE" b="0" i="0" u="none" strike="noStrike" dirty="0">
-                <a:solidFill>
-                  <a:srgbClr val="E8EAED"/>
-                </a:solidFill>
-                <a:effectLst/>
-                <a:latin typeface="Google Sans"/>
-              </a:rPr>
-              <a:t>: Beispielsweise die Datensätze 1000 bis 1100 von 200.000 Datensätzen.</a:t>
-            </a:r>
-          </a:p>
-          <a:p>
-            <a:endParaRPr lang="de-AT" b="0" i="0" u="none" strike="noStrike" dirty="0">
-              <a:solidFill>
-                <a:srgbClr val="E8EAED"/>
-              </a:solidFill>
-              <a:effectLst/>
-              <a:latin typeface="Google Sans"/>
-            </a:endParaRPr>
-          </a:p>
-          <a:p>
-            <a:pPr marL="0" marR="0" lvl="0" indent="0" algn="l" defTabSz="914400" rtl="0" eaLnBrk="1" fontAlgn="auto" latinLnBrk="0" hangingPunct="1">
-              <a:lnSpc>
-                <a:spcPct val="100000"/>
-              </a:lnSpc>
-              <a:spcBef>
-                <a:spcPts val="0"/>
-              </a:spcBef>
-              <a:spcAft>
-                <a:spcPts val="0"/>
-              </a:spcAft>
-              <a:buClrTx/>
-              <a:buSzTx/>
-              <a:buFontTx/>
-              <a:buNone/>
-              <a:tabLst/>
-              <a:defRPr/>
-            </a:pPr>
-            <a:r>
-              <a:rPr lang="en-US" b="0" i="0" u="none" strike="noStrike" dirty="0" err="1">
-                <a:solidFill>
-                  <a:srgbClr val="373737"/>
-                </a:solidFill>
-                <a:effectLst/>
-                <a:latin typeface="Open Sans" panose="020F0502020204030204" pitchFamily="34" charset="0"/>
-              </a:rPr>
-              <a:t>Erklärung</a:t>
-            </a:r>
-            <a:r>
-              <a:rPr lang="en-US" b="0" i="0" u="none" strike="noStrike" dirty="0">
-                <a:solidFill>
-                  <a:srgbClr val="373737"/>
-                </a:solidFill>
-                <a:effectLst/>
-                <a:latin typeface="Open Sans" panose="020F0502020204030204" pitchFamily="34" charset="0"/>
-              </a:rPr>
-              <a:t> des </a:t>
-            </a:r>
-            <a:r>
-              <a:rPr lang="en-US" b="0" i="0" u="none" strike="noStrike" dirty="0" err="1">
-                <a:solidFill>
-                  <a:srgbClr val="373737"/>
-                </a:solidFill>
-                <a:effectLst/>
-                <a:latin typeface="Open Sans" panose="020F0502020204030204" pitchFamily="34" charset="0"/>
-              </a:rPr>
-              <a:t>Begriffs</a:t>
-            </a:r>
-            <a:r>
-              <a:rPr lang="en-US" b="0" i="0" u="none" strike="noStrike" dirty="0">
-                <a:solidFill>
-                  <a:srgbClr val="373737"/>
-                </a:solidFill>
-                <a:effectLst/>
-                <a:latin typeface="Open Sans" panose="020F0502020204030204" pitchFamily="34" charset="0"/>
-              </a:rPr>
-              <a:t>: Paging</a:t>
-            </a:r>
-          </a:p>
-          <a:p>
-            <a:pPr algn="l"/>
-            <a:r>
-              <a:rPr lang="de-DE" b="0" i="0" u="none" strike="noStrike" dirty="0">
-                <a:solidFill>
-                  <a:srgbClr val="373737"/>
-                </a:solidFill>
-                <a:effectLst/>
-                <a:latin typeface="Open Sans" panose="020B0606030504020204" pitchFamily="34" charset="0"/>
-              </a:rPr>
-              <a:t>Was ist </a:t>
-            </a:r>
-            <a:r>
-              <a:rPr lang="de-DE" b="0" i="0" u="none" strike="noStrike" dirty="0" err="1">
-                <a:solidFill>
-                  <a:srgbClr val="373737"/>
-                </a:solidFill>
-                <a:effectLst/>
-                <a:latin typeface="Open Sans" panose="020B0606030504020204" pitchFamily="34" charset="0"/>
-              </a:rPr>
-              <a:t>Paging</a:t>
-            </a:r>
-            <a:r>
-              <a:rPr lang="de-DE" b="0" i="0" u="none" strike="noStrike" dirty="0">
-                <a:solidFill>
-                  <a:srgbClr val="373737"/>
-                </a:solidFill>
-                <a:effectLst/>
-                <a:latin typeface="Open Sans" panose="020B0606030504020204" pitchFamily="34" charset="0"/>
-              </a:rPr>
-              <a:t>?</a:t>
-            </a:r>
-          </a:p>
-          <a:p>
-            <a:pPr algn="l">
-              <a:buFont typeface="Arial" panose="020B0604020202020204" pitchFamily="34" charset="0"/>
-              <a:buChar char="•"/>
-            </a:pPr>
-            <a:r>
-              <a:rPr lang="de-DE" b="0" i="0" u="none" strike="noStrike" dirty="0" err="1">
-                <a:solidFill>
-                  <a:srgbClr val="676667"/>
-                </a:solidFill>
-                <a:effectLst/>
-                <a:latin typeface="Arial" panose="020B0604020202020204" pitchFamily="34" charset="0"/>
-              </a:rPr>
-              <a:t>Paging</a:t>
-            </a:r>
-            <a:r>
-              <a:rPr lang="de-DE" b="0" i="0" u="none" strike="noStrike" dirty="0">
-                <a:solidFill>
-                  <a:srgbClr val="676667"/>
-                </a:solidFill>
-                <a:effectLst/>
-                <a:latin typeface="Arial" panose="020B0604020202020204" pitchFamily="34" charset="0"/>
-              </a:rPr>
-              <a:t> bedeutet grundsätzlich, Daten seitenweise zu verarbeiten. Wenn man </a:t>
-            </a:r>
-            <a:r>
-              <a:rPr lang="de-DE" b="0" i="0" u="none" strike="noStrike" dirty="0" err="1">
-                <a:solidFill>
-                  <a:srgbClr val="676667"/>
-                </a:solidFill>
-                <a:effectLst/>
-                <a:latin typeface="Arial" panose="020B0604020202020204" pitchFamily="34" charset="0"/>
-              </a:rPr>
-              <a:t>Paging</a:t>
-            </a:r>
-            <a:r>
-              <a:rPr lang="de-DE" b="0" i="0" u="none" strike="noStrike" dirty="0">
-                <a:solidFill>
-                  <a:srgbClr val="676667"/>
-                </a:solidFill>
-                <a:effectLst/>
-                <a:latin typeface="Arial" panose="020B0604020202020204" pitchFamily="34" charset="0"/>
-              </a:rPr>
-              <a:t> in der Benutzeroberfläche verwendet, dann muss der Benutzer explizit durch eine Aktion (Klick auf eine Schaltfläche) zur nächsten Seite blättern. Das ist ein beliebtes UI-Design-Muster in klassischen Webanwendungen. Aber diese Vorgehensweise ist verpönt in Desktop-Anwendungen und modernen Web-Anwendungen.</a:t>
-            </a:r>
-            <a:br>
-              <a:rPr lang="de-DE" b="0" i="0" u="none" strike="noStrike" dirty="0">
-                <a:solidFill>
-                  <a:srgbClr val="676667"/>
-                </a:solidFill>
-                <a:effectLst/>
-                <a:latin typeface="Arial" panose="020B0604020202020204" pitchFamily="34" charset="0"/>
-              </a:rPr>
-            </a:br>
-            <a:br>
-              <a:rPr lang="de-DE" b="0" i="0" u="none" strike="noStrike" dirty="0">
-                <a:solidFill>
-                  <a:srgbClr val="676667"/>
-                </a:solidFill>
-                <a:effectLst/>
-                <a:latin typeface="Arial" panose="020B0604020202020204" pitchFamily="34" charset="0"/>
-              </a:rPr>
-            </a:br>
-            <a:r>
-              <a:rPr lang="de-DE" b="0" i="0" u="none" strike="noStrike" dirty="0" err="1">
-                <a:solidFill>
-                  <a:srgbClr val="676667"/>
-                </a:solidFill>
-                <a:effectLst/>
-                <a:latin typeface="Arial" panose="020B0604020202020204" pitchFamily="34" charset="0"/>
-              </a:rPr>
-              <a:t>Paging</a:t>
-            </a:r>
-            <a:r>
-              <a:rPr lang="de-DE" b="0" i="0" u="none" strike="noStrike" dirty="0">
-                <a:solidFill>
-                  <a:srgbClr val="676667"/>
-                </a:solidFill>
-                <a:effectLst/>
-                <a:latin typeface="Arial" panose="020B0604020202020204" pitchFamily="34" charset="0"/>
-              </a:rPr>
-              <a:t> auf Datenbankebene bedeutet, nicht eine gesamte Datenmenge vom </a:t>
-            </a:r>
-            <a:r>
-              <a:rPr lang="de-DE" b="0" i="0" u="none" strike="noStrike" dirty="0">
-                <a:solidFill>
-                  <a:srgbClr val="449ADC"/>
-                </a:solidFill>
-                <a:effectLst/>
-                <a:latin typeface="Arial" panose="020B0604020202020204" pitchFamily="34" charset="0"/>
-                <a:hlinkClick r:id="rId3" tooltip="Weitere Information zu: Datenbankmanagementsystem"/>
-              </a:rPr>
-              <a:t>Datenbankmanagementsystem</a:t>
-            </a:r>
-            <a:r>
-              <a:rPr lang="de-DE" b="0" i="0" u="none" strike="noStrike" dirty="0">
-                <a:solidFill>
-                  <a:srgbClr val="676667"/>
-                </a:solidFill>
-                <a:effectLst/>
-                <a:latin typeface="Arial" panose="020B0604020202020204" pitchFamily="34" charset="0"/>
-              </a:rPr>
-              <a:t> abzuholen, sondern aus einer Ergebnismenge nur eine Teilmenge anhand der Position in der Ergebnismenge: Beispielsweise die Datensätze 1000 bis 1100 von 200.000 Datensätzen.</a:t>
-            </a:r>
-            <a:br>
-              <a:rPr lang="de-DE" b="0" i="0" u="none" strike="noStrike" dirty="0">
-                <a:solidFill>
-                  <a:srgbClr val="676667"/>
-                </a:solidFill>
-                <a:effectLst/>
-                <a:latin typeface="Arial" panose="020B0604020202020204" pitchFamily="34" charset="0"/>
-              </a:rPr>
-            </a:br>
-            <a:br>
-              <a:rPr lang="de-DE" b="0" i="0" u="none" strike="noStrike" dirty="0">
-                <a:solidFill>
-                  <a:srgbClr val="676667"/>
-                </a:solidFill>
-                <a:effectLst/>
-                <a:latin typeface="Arial" panose="020B0604020202020204" pitchFamily="34" charset="0"/>
-              </a:rPr>
-            </a:br>
-            <a:r>
-              <a:rPr lang="de-DE" b="0" i="0" u="none" strike="noStrike" dirty="0">
-                <a:solidFill>
-                  <a:srgbClr val="676667"/>
-                </a:solidFill>
-                <a:effectLst/>
-                <a:latin typeface="Arial" panose="020B0604020202020204" pitchFamily="34" charset="0"/>
-              </a:rPr>
-              <a:t>Wer schon einmal </a:t>
-            </a:r>
-            <a:r>
-              <a:rPr lang="de-DE" b="0" i="0" u="none" strike="noStrike" dirty="0" err="1">
-                <a:solidFill>
-                  <a:srgbClr val="676667"/>
-                </a:solidFill>
-                <a:effectLst/>
-                <a:latin typeface="Arial" panose="020B0604020202020204" pitchFamily="34" charset="0"/>
-              </a:rPr>
-              <a:t>Paging</a:t>
-            </a:r>
-            <a:r>
-              <a:rPr lang="de-DE" b="0" i="0" u="none" strike="noStrike" dirty="0">
-                <a:solidFill>
-                  <a:srgbClr val="676667"/>
-                </a:solidFill>
-                <a:effectLst/>
-                <a:latin typeface="Arial" panose="020B0604020202020204" pitchFamily="34" charset="0"/>
-              </a:rPr>
-              <a:t> in SQL realisiert hat, weiß, dass das die Syntax kein Spaß ist – zumindest nicht in </a:t>
-            </a:r>
-            <a:r>
-              <a:rPr lang="de-DE" b="0" i="0" u="none" strike="noStrike" dirty="0">
-                <a:solidFill>
-                  <a:srgbClr val="449ADC"/>
-                </a:solidFill>
-                <a:effectLst/>
-                <a:latin typeface="Arial" panose="020B0604020202020204" pitchFamily="34" charset="0"/>
-                <a:hlinkClick r:id="rId3" tooltip="Weitere Information zu: Datenbankmanagementsystem"/>
-              </a:rPr>
-              <a:t>Datenbankmanagementsystem</a:t>
-            </a:r>
-            <a:r>
-              <a:rPr lang="de-DE" b="0" i="0" u="none" strike="noStrike" dirty="0">
-                <a:solidFill>
-                  <a:srgbClr val="676667"/>
-                </a:solidFill>
-                <a:effectLst/>
-                <a:latin typeface="Arial" panose="020B0604020202020204" pitchFamily="34" charset="0"/>
-              </a:rPr>
-              <a:t>en, die nicht keine </a:t>
-            </a:r>
-            <a:r>
-              <a:rPr lang="de-DE" b="0" i="0" u="none" strike="noStrike" dirty="0" err="1">
-                <a:solidFill>
-                  <a:srgbClr val="449ADC"/>
-                </a:solidFill>
-                <a:effectLst/>
-                <a:latin typeface="Arial" panose="020B0604020202020204" pitchFamily="34" charset="0"/>
-                <a:hlinkClick r:id="rId4" tooltip="Weitere Information zu: Row Limiting Clauses"/>
-              </a:rPr>
-              <a:t>Row</a:t>
-            </a:r>
-            <a:r>
-              <a:rPr lang="de-DE" b="0" i="0" u="none" strike="noStrike" dirty="0">
-                <a:solidFill>
-                  <a:srgbClr val="449ADC"/>
-                </a:solidFill>
-                <a:effectLst/>
-                <a:latin typeface="Arial" panose="020B0604020202020204" pitchFamily="34" charset="0"/>
-                <a:hlinkClick r:id="rId4" tooltip="Weitere Information zu: Row Limiting Clauses"/>
-              </a:rPr>
-              <a:t> </a:t>
-            </a:r>
-            <a:r>
-              <a:rPr lang="de-DE" b="0" i="0" u="none" strike="noStrike" dirty="0" err="1">
-                <a:solidFill>
-                  <a:srgbClr val="449ADC"/>
-                </a:solidFill>
-                <a:effectLst/>
-                <a:latin typeface="Arial" panose="020B0604020202020204" pitchFamily="34" charset="0"/>
-                <a:hlinkClick r:id="rId4" tooltip="Weitere Information zu: Row Limiting Clauses"/>
-              </a:rPr>
-              <a:t>Limiting</a:t>
-            </a:r>
-            <a:r>
-              <a:rPr lang="de-DE" b="0" i="0" u="none" strike="noStrike" dirty="0">
-                <a:solidFill>
-                  <a:srgbClr val="449ADC"/>
-                </a:solidFill>
-                <a:effectLst/>
-                <a:latin typeface="Arial" panose="020B0604020202020204" pitchFamily="34" charset="0"/>
-                <a:hlinkClick r:id="rId4" tooltip="Weitere Information zu: Row Limiting Clauses"/>
-              </a:rPr>
-              <a:t> </a:t>
-            </a:r>
-            <a:r>
-              <a:rPr lang="de-DE" b="0" i="0" u="none" strike="noStrike" dirty="0" err="1">
-                <a:solidFill>
-                  <a:srgbClr val="449ADC"/>
-                </a:solidFill>
-                <a:effectLst/>
-                <a:latin typeface="Arial" panose="020B0604020202020204" pitchFamily="34" charset="0"/>
-                <a:hlinkClick r:id="rId4" tooltip="Weitere Information zu: Row Limiting Clauses"/>
-              </a:rPr>
-              <a:t>Clauses</a:t>
-            </a:r>
-            <a:r>
-              <a:rPr lang="de-DE" b="0" i="0" u="none" strike="noStrike" dirty="0">
-                <a:solidFill>
-                  <a:srgbClr val="676667"/>
-                </a:solidFill>
-                <a:effectLst/>
-                <a:latin typeface="Arial" panose="020B0604020202020204" pitchFamily="34" charset="0"/>
-              </a:rPr>
-              <a:t> mit den Schlüsselwörtern OFFSET, FETCH FIRST und FETCH NEXT aus dem SQL-</a:t>
-            </a:r>
-            <a:r>
-              <a:rPr lang="de-DE" b="0" i="0" u="none" strike="noStrike" dirty="0">
-                <a:solidFill>
-                  <a:srgbClr val="449ADC"/>
-                </a:solidFill>
-                <a:effectLst/>
-                <a:latin typeface="Arial" panose="020B0604020202020204" pitchFamily="34" charset="0"/>
-                <a:hlinkClick r:id="rId5" tooltip="Weitere Information zu: ANSI"/>
-              </a:rPr>
-              <a:t>ANSI</a:t>
-            </a:r>
-            <a:r>
-              <a:rPr lang="de-DE" b="0" i="0" u="none" strike="noStrike" dirty="0">
-                <a:solidFill>
-                  <a:srgbClr val="676667"/>
-                </a:solidFill>
-                <a:effectLst/>
-                <a:latin typeface="Arial" panose="020B0604020202020204" pitchFamily="34" charset="0"/>
-              </a:rPr>
-              <a:t>-Standard des Jahres 2008 (</a:t>
-            </a:r>
-            <a:r>
-              <a:rPr lang="de-DE" b="0" i="0" u="none" strike="noStrike" dirty="0">
-                <a:solidFill>
-                  <a:srgbClr val="449ADC"/>
-                </a:solidFill>
-                <a:effectLst/>
-                <a:latin typeface="Arial" panose="020B0604020202020204" pitchFamily="34" charset="0"/>
-                <a:hlinkClick r:id="rId6" tooltip="Weitere Information zu: ISO"/>
-              </a:rPr>
-              <a:t>ISO</a:t>
-            </a:r>
-            <a:r>
-              <a:rPr lang="de-DE" b="0" i="0" u="none" strike="noStrike" dirty="0">
-                <a:solidFill>
-                  <a:srgbClr val="676667"/>
-                </a:solidFill>
-                <a:effectLst/>
-                <a:latin typeface="Arial" panose="020B0604020202020204" pitchFamily="34" charset="0"/>
-              </a:rPr>
-              <a:t>/IEC 9075:2008, siehe [1]) unterstützen. Microsoft bietet diese Unterstützung im </a:t>
-            </a:r>
-            <a:r>
-              <a:rPr lang="de-DE" b="0" i="0" u="none" strike="noStrike" dirty="0">
-                <a:solidFill>
-                  <a:srgbClr val="449ADC"/>
-                </a:solidFill>
-                <a:effectLst/>
-                <a:latin typeface="Arial" panose="020B0604020202020204" pitchFamily="34" charset="0"/>
-                <a:hlinkClick r:id="rId7" tooltip="Weitere Information zu: Microsoft SQL Server"/>
-              </a:rPr>
-              <a:t>Microsoft SQL Server</a:t>
-            </a:r>
-            <a:r>
-              <a:rPr lang="de-DE" b="0" i="0" u="none" strike="noStrike" dirty="0">
-                <a:solidFill>
-                  <a:srgbClr val="676667"/>
-                </a:solidFill>
-                <a:effectLst/>
-                <a:latin typeface="Arial" panose="020B0604020202020204" pitchFamily="34" charset="0"/>
-              </a:rPr>
-              <a:t> ab Version 2012 (erschienen am 2.4.2012) an. </a:t>
-            </a:r>
-            <a:r>
-              <a:rPr lang="de-DE" b="0" i="0" u="none" strike="noStrike" dirty="0">
-                <a:solidFill>
-                  <a:srgbClr val="449ADC"/>
-                </a:solidFill>
-                <a:effectLst/>
-                <a:latin typeface="Arial" panose="020B0604020202020204" pitchFamily="34" charset="0"/>
-                <a:hlinkClick r:id="rId8" tooltip="Weitere Information zu: Oracle"/>
-              </a:rPr>
-              <a:t>Oracle</a:t>
-            </a:r>
-            <a:r>
-              <a:rPr lang="de-DE" b="0" i="0" u="none" strike="noStrike" dirty="0">
-                <a:solidFill>
-                  <a:srgbClr val="676667"/>
-                </a:solidFill>
-                <a:effectLst/>
-                <a:latin typeface="Arial" panose="020B0604020202020204" pitchFamily="34" charset="0"/>
-              </a:rPr>
-              <a:t> bietet es seit Version 12c (erschienen am 1.7.2013).</a:t>
-            </a:r>
-            <a:br>
-              <a:rPr lang="de-DE" b="0" i="0" u="none" strike="noStrike" dirty="0">
-                <a:solidFill>
-                  <a:srgbClr val="676667"/>
-                </a:solidFill>
-                <a:effectLst/>
-                <a:latin typeface="Arial" panose="020B0604020202020204" pitchFamily="34" charset="0"/>
-              </a:rPr>
-            </a:br>
-            <a:br>
-              <a:rPr lang="de-DE" b="0" i="0" u="none" strike="noStrike" dirty="0">
-                <a:solidFill>
-                  <a:srgbClr val="676667"/>
-                </a:solidFill>
-                <a:effectLst/>
-                <a:latin typeface="Arial" panose="020B0604020202020204" pitchFamily="34" charset="0"/>
-              </a:rPr>
-            </a:br>
-            <a:r>
-              <a:rPr lang="de-DE" b="0" i="0" u="none" strike="noStrike" dirty="0">
-                <a:solidFill>
-                  <a:srgbClr val="676667"/>
-                </a:solidFill>
-                <a:effectLst/>
-                <a:latin typeface="Arial" panose="020B0604020202020204" pitchFamily="34" charset="0"/>
-              </a:rPr>
-              <a:t>So eine </a:t>
-            </a:r>
-            <a:r>
-              <a:rPr lang="de-DE" b="0" i="0" u="none" strike="noStrike" dirty="0" err="1">
-                <a:solidFill>
-                  <a:srgbClr val="449ADC"/>
-                </a:solidFill>
-                <a:effectLst/>
-                <a:latin typeface="Arial" panose="020B0604020202020204" pitchFamily="34" charset="0"/>
-                <a:hlinkClick r:id="rId4" tooltip="Weitere Information zu: Row Limiting Clauses"/>
-              </a:rPr>
-              <a:t>Row</a:t>
-            </a:r>
-            <a:r>
-              <a:rPr lang="de-DE" b="0" i="0" u="none" strike="noStrike" dirty="0">
-                <a:solidFill>
-                  <a:srgbClr val="449ADC"/>
-                </a:solidFill>
-                <a:effectLst/>
-                <a:latin typeface="Arial" panose="020B0604020202020204" pitchFamily="34" charset="0"/>
-                <a:hlinkClick r:id="rId4" tooltip="Weitere Information zu: Row Limiting Clauses"/>
-              </a:rPr>
-              <a:t> </a:t>
-            </a:r>
-            <a:r>
-              <a:rPr lang="de-DE" b="0" i="0" u="none" strike="noStrike" dirty="0" err="1">
-                <a:solidFill>
-                  <a:srgbClr val="449ADC"/>
-                </a:solidFill>
-                <a:effectLst/>
-                <a:latin typeface="Arial" panose="020B0604020202020204" pitchFamily="34" charset="0"/>
-                <a:hlinkClick r:id="rId4" tooltip="Weitere Information zu: Row Limiting Clauses"/>
-              </a:rPr>
-              <a:t>Limiting</a:t>
-            </a:r>
-            <a:r>
-              <a:rPr lang="de-DE" b="0" i="0" u="none" strike="noStrike" dirty="0">
-                <a:solidFill>
-                  <a:srgbClr val="449ADC"/>
-                </a:solidFill>
-                <a:effectLst/>
-                <a:latin typeface="Arial" panose="020B0604020202020204" pitchFamily="34" charset="0"/>
-                <a:hlinkClick r:id="rId4" tooltip="Weitere Information zu: Row Limiting Clauses"/>
-              </a:rPr>
-              <a:t> </a:t>
-            </a:r>
-            <a:r>
-              <a:rPr lang="de-DE" b="0" i="0" u="none" strike="noStrike" dirty="0" err="1">
-                <a:solidFill>
-                  <a:srgbClr val="449ADC"/>
-                </a:solidFill>
-                <a:effectLst/>
-                <a:latin typeface="Arial" panose="020B0604020202020204" pitchFamily="34" charset="0"/>
-                <a:hlinkClick r:id="rId4" tooltip="Weitere Information zu: Row Limiting Clauses"/>
-              </a:rPr>
-              <a:t>Clauses</a:t>
-            </a:r>
-            <a:r>
-              <a:rPr lang="de-DE" b="0" i="0" u="none" strike="noStrike" dirty="0">
-                <a:solidFill>
-                  <a:srgbClr val="676667"/>
-                </a:solidFill>
-                <a:effectLst/>
-                <a:latin typeface="Arial" panose="020B0604020202020204" pitchFamily="34" charset="0"/>
-              </a:rPr>
-              <a:t> sieht in </a:t>
-            </a:r>
-            <a:r>
-              <a:rPr lang="de-DE" b="0" i="0" u="none" strike="noStrike" dirty="0">
-                <a:solidFill>
-                  <a:srgbClr val="449ADC"/>
-                </a:solidFill>
-                <a:effectLst/>
-                <a:latin typeface="Arial" panose="020B0604020202020204" pitchFamily="34" charset="0"/>
-                <a:hlinkClick r:id="rId5" tooltip="Weitere Information zu: ANSI"/>
-              </a:rPr>
-              <a:t>ANSI</a:t>
-            </a:r>
-            <a:r>
-              <a:rPr lang="de-DE" b="0" i="0" u="none" strike="noStrike" dirty="0">
-                <a:solidFill>
-                  <a:srgbClr val="676667"/>
-                </a:solidFill>
-                <a:effectLst/>
-                <a:latin typeface="Arial" panose="020B0604020202020204" pitchFamily="34" charset="0"/>
-              </a:rPr>
-              <a:t>-SQL so aus:</a:t>
-            </a:r>
-            <a:br>
-              <a:rPr lang="de-DE" b="0" i="0" u="none" strike="noStrike" dirty="0">
-                <a:solidFill>
-                  <a:srgbClr val="676667"/>
-                </a:solidFill>
-                <a:effectLst/>
-                <a:latin typeface="Arial" panose="020B0604020202020204" pitchFamily="34" charset="0"/>
-              </a:rPr>
-            </a:br>
-            <a:br>
-              <a:rPr lang="de-DE" b="0" i="0" u="none" strike="noStrike" dirty="0">
-                <a:solidFill>
-                  <a:srgbClr val="676667"/>
-                </a:solidFill>
-                <a:effectLst/>
-                <a:latin typeface="Arial" panose="020B0604020202020204" pitchFamily="34" charset="0"/>
-              </a:rPr>
-            </a:br>
-            <a:r>
-              <a:rPr lang="de-DE" b="0" i="0" u="none" strike="noStrike" dirty="0">
-                <a:solidFill>
-                  <a:srgbClr val="676667"/>
-                </a:solidFill>
-                <a:effectLst/>
-                <a:latin typeface="Arial" panose="020B0604020202020204" pitchFamily="34" charset="0"/>
-              </a:rPr>
-              <a:t>SELECT * </a:t>
-            </a:r>
-            <a:r>
-              <a:rPr lang="de-DE" b="0" i="0" u="none" strike="noStrike" dirty="0" err="1">
-                <a:solidFill>
-                  <a:srgbClr val="676667"/>
-                </a:solidFill>
-                <a:effectLst/>
-                <a:latin typeface="Arial" panose="020B0604020202020204" pitchFamily="34" charset="0"/>
-              </a:rPr>
-              <a:t>from</a:t>
-            </a:r>
-            <a:r>
-              <a:rPr lang="de-DE" b="0" i="0" u="none" strike="noStrike" dirty="0">
-                <a:solidFill>
-                  <a:srgbClr val="676667"/>
-                </a:solidFill>
-                <a:effectLst/>
-                <a:latin typeface="Arial" panose="020B0604020202020204" pitchFamily="34" charset="0"/>
-              </a:rPr>
-              <a:t> [Betrieb].Flug </a:t>
-            </a:r>
-            <a:r>
-              <a:rPr lang="de-DE" b="0" i="0" u="none" strike="noStrike" dirty="0" err="1">
-                <a:solidFill>
-                  <a:srgbClr val="676667"/>
-                </a:solidFill>
-                <a:effectLst/>
-                <a:latin typeface="Arial" panose="020B0604020202020204" pitchFamily="34" charset="0"/>
-              </a:rPr>
-              <a:t>order</a:t>
-            </a:r>
-            <a:r>
-              <a:rPr lang="de-DE" b="0" i="0" u="none" strike="noStrike" dirty="0">
-                <a:solidFill>
-                  <a:srgbClr val="676667"/>
-                </a:solidFill>
-                <a:effectLst/>
-                <a:latin typeface="Arial" panose="020B0604020202020204" pitchFamily="34" charset="0"/>
-              </a:rPr>
-              <a:t> </a:t>
-            </a:r>
-            <a:r>
-              <a:rPr lang="de-DE" b="0" i="0" u="none" strike="noStrike" dirty="0" err="1">
-                <a:solidFill>
-                  <a:srgbClr val="676667"/>
-                </a:solidFill>
-                <a:effectLst/>
-                <a:latin typeface="Arial" panose="020B0604020202020204" pitchFamily="34" charset="0"/>
-              </a:rPr>
-              <a:t>by</a:t>
-            </a:r>
-            <a:r>
-              <a:rPr lang="de-DE" b="0" i="0" u="none" strike="noStrike" dirty="0">
-                <a:solidFill>
-                  <a:srgbClr val="676667"/>
-                </a:solidFill>
-                <a:effectLst/>
-                <a:latin typeface="Arial" panose="020B0604020202020204" pitchFamily="34" charset="0"/>
-              </a:rPr>
-              <a:t> </a:t>
-            </a:r>
-            <a:r>
-              <a:rPr lang="de-DE" b="0" i="0" u="none" strike="noStrike" dirty="0" err="1">
-                <a:solidFill>
-                  <a:srgbClr val="676667"/>
-                </a:solidFill>
-                <a:effectLst/>
-                <a:latin typeface="Arial" panose="020B0604020202020204" pitchFamily="34" charset="0"/>
-              </a:rPr>
-              <a:t>FlugNr</a:t>
-            </a:r>
-            <a:r>
-              <a:rPr lang="de-DE" b="0" i="0" u="none" strike="noStrike" dirty="0">
-                <a:solidFill>
-                  <a:srgbClr val="676667"/>
-                </a:solidFill>
-                <a:effectLst/>
-                <a:latin typeface="Arial" panose="020B0604020202020204" pitchFamily="34" charset="0"/>
-              </a:rPr>
-              <a:t> OFFSET 101 ROWS FETCH NEXT 100 ROWS ONLY; </a:t>
-            </a:r>
-            <a:br>
-              <a:rPr lang="de-DE" b="0" i="0" u="none" strike="noStrike" dirty="0">
-                <a:solidFill>
-                  <a:srgbClr val="676667"/>
-                </a:solidFill>
-                <a:effectLst/>
-                <a:latin typeface="Arial" panose="020B0604020202020204" pitchFamily="34" charset="0"/>
-              </a:rPr>
-            </a:br>
-            <a:br>
-              <a:rPr lang="de-DE" b="0" i="0" u="none" strike="noStrike" dirty="0">
-                <a:solidFill>
-                  <a:srgbClr val="676667"/>
-                </a:solidFill>
-                <a:effectLst/>
-                <a:latin typeface="Arial" panose="020B0604020202020204" pitchFamily="34" charset="0"/>
-              </a:rPr>
-            </a:br>
-            <a:r>
-              <a:rPr lang="de-DE" b="0" i="0" u="none" strike="noStrike" dirty="0">
-                <a:solidFill>
-                  <a:srgbClr val="676667"/>
-                </a:solidFill>
-                <a:effectLst/>
-                <a:latin typeface="Arial" panose="020B0604020202020204" pitchFamily="34" charset="0"/>
-              </a:rPr>
-              <a:t>Dabei gelten folgende </a:t>
-            </a:r>
-            <a:r>
-              <a:rPr lang="de-DE" b="0" i="0" u="none" strike="noStrike" dirty="0" err="1">
-                <a:solidFill>
-                  <a:srgbClr val="676667"/>
-                </a:solidFill>
-                <a:effectLst/>
-                <a:latin typeface="Arial" panose="020B0604020202020204" pitchFamily="34" charset="0"/>
-              </a:rPr>
-              <a:t>Regeln:FETCH</a:t>
-            </a:r>
-            <a:r>
-              <a:rPr lang="de-DE" b="0" i="0" u="none" strike="noStrike" dirty="0">
-                <a:solidFill>
-                  <a:srgbClr val="676667"/>
-                </a:solidFill>
-                <a:effectLst/>
-                <a:latin typeface="Arial" panose="020B0604020202020204" pitchFamily="34" charset="0"/>
-              </a:rPr>
-              <a:t> kann nur zusammen mit OFFSET verwendet werden.</a:t>
-            </a:r>
-          </a:p>
-          <a:p>
-            <a:pPr algn="l">
-              <a:buFont typeface="Arial" panose="020B0604020202020204" pitchFamily="34" charset="0"/>
-              <a:buChar char="•"/>
-            </a:pPr>
-            <a:r>
-              <a:rPr lang="de-DE" b="0" i="0" u="none" strike="noStrike" dirty="0">
-                <a:solidFill>
-                  <a:srgbClr val="676667"/>
-                </a:solidFill>
-                <a:effectLst/>
-                <a:latin typeface="Arial" panose="020B0604020202020204" pitchFamily="34" charset="0"/>
-              </a:rPr>
-              <a:t>Das Sortieren des </a:t>
-            </a:r>
-            <a:r>
-              <a:rPr lang="de-DE" b="0" i="0" u="none" strike="noStrike" dirty="0" err="1">
-                <a:solidFill>
-                  <a:srgbClr val="676667"/>
-                </a:solidFill>
-                <a:effectLst/>
-                <a:latin typeface="Arial" panose="020B0604020202020204" pitchFamily="34" charset="0"/>
-              </a:rPr>
-              <a:t>Resultsets</a:t>
-            </a:r>
-            <a:r>
-              <a:rPr lang="de-DE" b="0" i="0" u="none" strike="noStrike" dirty="0">
-                <a:solidFill>
-                  <a:srgbClr val="676667"/>
-                </a:solidFill>
-                <a:effectLst/>
-                <a:latin typeface="Arial" panose="020B0604020202020204" pitchFamily="34" charset="0"/>
-              </a:rPr>
-              <a:t> mit ORDER BY ist verpflichtend.</a:t>
-            </a:r>
-          </a:p>
-          <a:p>
-            <a:pPr algn="l">
-              <a:buFont typeface="Arial" panose="020B0604020202020204" pitchFamily="34" charset="0"/>
-              <a:buChar char="•"/>
-            </a:pPr>
-            <a:r>
-              <a:rPr lang="de-DE" b="0" i="0" u="none" strike="noStrike" dirty="0">
-                <a:solidFill>
-                  <a:srgbClr val="676667"/>
-                </a:solidFill>
-                <a:effectLst/>
-                <a:latin typeface="Arial" panose="020B0604020202020204" pitchFamily="34" charset="0"/>
-              </a:rPr>
-              <a:t>TOP kann nicht mit OFFSET und FETCH kombiniert werden.</a:t>
-            </a:r>
-          </a:p>
-          <a:p>
-            <a:pPr algn="l">
-              <a:buFont typeface="Arial" panose="020B0604020202020204" pitchFamily="34" charset="0"/>
-              <a:buChar char="•"/>
-            </a:pPr>
-            <a:r>
-              <a:rPr lang="de-DE" b="0" i="0" u="none" strike="noStrike" dirty="0">
-                <a:solidFill>
-                  <a:srgbClr val="676667"/>
-                </a:solidFill>
-                <a:effectLst/>
-                <a:latin typeface="Arial" panose="020B0604020202020204" pitchFamily="34" charset="0"/>
-              </a:rPr>
-              <a:t>Die Werte bei OFFSET und FETCH müssen Ganzzahlen sein.</a:t>
-            </a:r>
-          </a:p>
-          <a:p>
-            <a:pPr algn="l"/>
-            <a:r>
-              <a:rPr lang="de-DE" b="0" i="0" u="none" strike="noStrike" dirty="0">
-                <a:solidFill>
-                  <a:srgbClr val="676667"/>
-                </a:solidFill>
-                <a:effectLst/>
-                <a:latin typeface="Arial" panose="020B0604020202020204" pitchFamily="34" charset="0"/>
-              </a:rPr>
-              <a:t>In älteren Versionen verwendet man die (nicht </a:t>
-            </a:r>
-            <a:r>
-              <a:rPr lang="de-DE" b="0" i="0" u="none" strike="noStrike" dirty="0" err="1">
-                <a:solidFill>
-                  <a:srgbClr val="676667"/>
-                </a:solidFill>
-                <a:effectLst/>
-                <a:latin typeface="Arial" panose="020B0604020202020204" pitchFamily="34" charset="0"/>
-              </a:rPr>
-              <a:t>standardardisierte</a:t>
-            </a:r>
-            <a:r>
-              <a:rPr lang="de-DE" b="0" i="0" u="none" strike="noStrike" dirty="0">
-                <a:solidFill>
-                  <a:srgbClr val="676667"/>
-                </a:solidFill>
-                <a:effectLst/>
-                <a:latin typeface="Arial" panose="020B0604020202020204" pitchFamily="34" charset="0"/>
-              </a:rPr>
-              <a:t>) </a:t>
-            </a:r>
-            <a:r>
-              <a:rPr lang="de-DE" b="0" i="0" u="none" strike="noStrike" dirty="0" err="1">
-                <a:solidFill>
-                  <a:srgbClr val="676667"/>
-                </a:solidFill>
-                <a:effectLst/>
-                <a:latin typeface="Arial" panose="020B0604020202020204" pitchFamily="34" charset="0"/>
-              </a:rPr>
-              <a:t>rownumber</a:t>
-            </a:r>
-            <a:r>
-              <a:rPr lang="de-DE" b="0" i="0" u="none" strike="noStrike" dirty="0">
-                <a:solidFill>
-                  <a:srgbClr val="676667"/>
-                </a:solidFill>
-                <a:effectLst/>
-                <a:latin typeface="Arial" panose="020B0604020202020204" pitchFamily="34" charset="0"/>
-              </a:rPr>
-              <a:t>()-Funktion in Verbindung mit dem Schlüsselwort TOP und einem Sub-Select, wobei es hier syntaktische Unterschiede zwischen </a:t>
-            </a:r>
-            <a:r>
-              <a:rPr lang="de-DE" b="0" i="0" u="none" strike="noStrike" dirty="0">
-                <a:solidFill>
-                  <a:srgbClr val="449ADC"/>
-                </a:solidFill>
-                <a:effectLst/>
-                <a:latin typeface="Arial" panose="020B0604020202020204" pitchFamily="34" charset="0"/>
-                <a:hlinkClick r:id="rId7" tooltip="Weitere Information zu: Microsoft SQL Server"/>
-              </a:rPr>
-              <a:t>Microsoft SQL Server</a:t>
-            </a:r>
-            <a:r>
-              <a:rPr lang="de-DE" b="0" i="0" u="none" strike="noStrike" dirty="0">
-                <a:solidFill>
-                  <a:srgbClr val="676667"/>
-                </a:solidFill>
-                <a:effectLst/>
-                <a:latin typeface="Arial" panose="020B0604020202020204" pitchFamily="34" charset="0"/>
-              </a:rPr>
-              <a:t> und </a:t>
-            </a:r>
-            <a:r>
-              <a:rPr lang="de-DE" b="0" i="0" u="none" strike="noStrike" dirty="0">
-                <a:solidFill>
-                  <a:srgbClr val="449ADC"/>
-                </a:solidFill>
-                <a:effectLst/>
-                <a:latin typeface="Arial" panose="020B0604020202020204" pitchFamily="34" charset="0"/>
-                <a:hlinkClick r:id="rId8" tooltip="Weitere Information zu: Oracle"/>
-              </a:rPr>
-              <a:t>Oracle</a:t>
-            </a:r>
-            <a:r>
-              <a:rPr lang="de-DE" b="0" i="0" u="none" strike="noStrike" dirty="0">
-                <a:solidFill>
-                  <a:srgbClr val="676667"/>
-                </a:solidFill>
-                <a:effectLst/>
-                <a:latin typeface="Arial" panose="020B0604020202020204" pitchFamily="34" charset="0"/>
-              </a:rPr>
-              <a:t> gibt. Listing 1 zeigt den </a:t>
-            </a:r>
-            <a:r>
-              <a:rPr lang="de-DE" b="0" i="0" u="none" strike="noStrike" dirty="0">
-                <a:solidFill>
-                  <a:srgbClr val="449ADC"/>
-                </a:solidFill>
-                <a:effectLst/>
-                <a:latin typeface="Arial" panose="020B0604020202020204" pitchFamily="34" charset="0"/>
-                <a:hlinkClick r:id="rId9" tooltip="Weitere Information zu: TSQL"/>
-              </a:rPr>
-              <a:t>TSQL</a:t>
-            </a:r>
-            <a:r>
-              <a:rPr lang="de-DE" b="0" i="0" u="none" strike="noStrike" dirty="0">
-                <a:solidFill>
-                  <a:srgbClr val="676667"/>
-                </a:solidFill>
-                <a:effectLst/>
-                <a:latin typeface="Arial" panose="020B0604020202020204" pitchFamily="34" charset="0"/>
-              </a:rPr>
-              <a:t>-Befehl für </a:t>
-            </a:r>
-            <a:r>
-              <a:rPr lang="de-DE" b="0" i="0" u="none" strike="noStrike" dirty="0">
-                <a:solidFill>
-                  <a:srgbClr val="449ADC"/>
-                </a:solidFill>
-                <a:effectLst/>
-                <a:latin typeface="Arial" panose="020B0604020202020204" pitchFamily="34" charset="0"/>
-                <a:hlinkClick r:id="rId7" tooltip="Weitere Information zu: Microsoft SQL Server"/>
-              </a:rPr>
-              <a:t>Microsoft SQL Server</a:t>
-            </a:r>
-            <a:r>
-              <a:rPr lang="de-DE" b="0" i="0" u="none" strike="noStrike" dirty="0">
-                <a:solidFill>
-                  <a:srgbClr val="676667"/>
-                </a:solidFill>
-                <a:effectLst/>
-                <a:latin typeface="Arial" panose="020B0604020202020204" pitchFamily="34" charset="0"/>
-              </a:rPr>
-              <a:t>, der die Datensätze 501 bis 600 aus der Datenbanktabelle "Flug" lädt.</a:t>
-            </a:r>
-            <a:br>
-              <a:rPr lang="de-DE" b="0" i="0" u="none" strike="noStrike" dirty="0">
-                <a:solidFill>
-                  <a:srgbClr val="676667"/>
-                </a:solidFill>
-                <a:effectLst/>
-                <a:latin typeface="Arial" panose="020B0604020202020204" pitchFamily="34" charset="0"/>
-              </a:rPr>
-            </a:br>
-            <a:br>
-              <a:rPr lang="de-DE" b="0" i="0" u="none" strike="noStrike" dirty="0">
-                <a:solidFill>
-                  <a:srgbClr val="676667"/>
-                </a:solidFill>
-                <a:effectLst/>
-                <a:latin typeface="Arial" panose="020B0604020202020204" pitchFamily="34" charset="0"/>
-              </a:rPr>
-            </a:br>
-            <a:r>
-              <a:rPr lang="de-DE" b="0" i="0" u="none" strike="noStrike" dirty="0">
-                <a:solidFill>
-                  <a:srgbClr val="676667"/>
-                </a:solidFill>
-                <a:effectLst/>
-                <a:latin typeface="Arial" panose="020B0604020202020204" pitchFamily="34" charset="0"/>
-              </a:rPr>
-              <a:t>SELECT TOP (100) *</a:t>
-            </a:r>
-            <a:br>
-              <a:rPr lang="de-DE" b="0" i="0" u="none" strike="noStrike" dirty="0">
-                <a:solidFill>
-                  <a:srgbClr val="676667"/>
-                </a:solidFill>
-                <a:effectLst/>
-                <a:latin typeface="Arial" panose="020B0604020202020204" pitchFamily="34" charset="0"/>
-              </a:rPr>
-            </a:br>
-            <a:r>
-              <a:rPr lang="de-DE" b="0" i="0" u="none" strike="noStrike" dirty="0">
-                <a:solidFill>
-                  <a:srgbClr val="676667"/>
-                </a:solidFill>
-                <a:effectLst/>
-                <a:latin typeface="Arial" panose="020B0604020202020204" pitchFamily="34" charset="0"/>
-              </a:rPr>
-              <a:t>FROM ( </a:t>
-            </a:r>
-            <a:br>
-              <a:rPr lang="de-DE" b="0" i="0" u="none" strike="noStrike" dirty="0">
-                <a:solidFill>
-                  <a:srgbClr val="676667"/>
-                </a:solidFill>
-                <a:effectLst/>
-                <a:latin typeface="Arial" panose="020B0604020202020204" pitchFamily="34" charset="0"/>
-              </a:rPr>
-            </a:br>
-            <a:r>
-              <a:rPr lang="de-DE" b="0" i="0" u="none" strike="noStrike" dirty="0">
-                <a:solidFill>
-                  <a:srgbClr val="676667"/>
-                </a:solidFill>
-                <a:effectLst/>
-                <a:latin typeface="Arial" panose="020B0604020202020204" pitchFamily="34" charset="0"/>
-              </a:rPr>
-              <a:t>SELECT *, </a:t>
-            </a:r>
-            <a:br>
-              <a:rPr lang="de-DE" b="0" i="0" u="none" strike="noStrike" dirty="0">
-                <a:solidFill>
-                  <a:srgbClr val="676667"/>
-                </a:solidFill>
-                <a:effectLst/>
-                <a:latin typeface="Arial" panose="020B0604020202020204" pitchFamily="34" charset="0"/>
-              </a:rPr>
-            </a:br>
-            <a:r>
-              <a:rPr lang="de-DE" b="0" i="0" u="none" strike="noStrike" dirty="0" err="1">
-                <a:solidFill>
-                  <a:srgbClr val="676667"/>
-                </a:solidFill>
-                <a:effectLst/>
-                <a:latin typeface="Arial" panose="020B0604020202020204" pitchFamily="34" charset="0"/>
-              </a:rPr>
-              <a:t>row</a:t>
-            </a:r>
-            <a:r>
-              <a:rPr lang="de-DE" b="0" i="0" u="sng" strike="noStrike" dirty="0" err="1">
-                <a:solidFill>
-                  <a:srgbClr val="676667"/>
-                </a:solidFill>
-                <a:effectLst/>
-                <a:latin typeface="Arial" panose="020B0604020202020204" pitchFamily="34" charset="0"/>
-              </a:rPr>
-              <a:t>number</a:t>
-            </a:r>
-            <a:r>
-              <a:rPr lang="de-DE" b="0" i="0" u="sng" strike="noStrike" dirty="0">
-                <a:solidFill>
-                  <a:srgbClr val="676667"/>
-                </a:solidFill>
-                <a:effectLst/>
-                <a:latin typeface="Arial" panose="020B0604020202020204" pitchFamily="34" charset="0"/>
-              </a:rPr>
-              <a:t>() OVER (ORDER BY [</a:t>
-            </a:r>
-            <a:r>
-              <a:rPr lang="de-DE" b="0" i="0" u="sng" strike="noStrike" dirty="0" err="1">
-                <a:solidFill>
-                  <a:srgbClr val="676667"/>
-                </a:solidFill>
-                <a:effectLst/>
-                <a:latin typeface="Arial" panose="020B0604020202020204" pitchFamily="34" charset="0"/>
-              </a:rPr>
-              <a:t>FlugNr</a:t>
-            </a:r>
-            <a:r>
-              <a:rPr lang="de-DE" b="0" i="0" u="sng" strike="noStrike" dirty="0">
-                <a:solidFill>
-                  <a:srgbClr val="676667"/>
-                </a:solidFill>
-                <a:effectLst/>
-                <a:latin typeface="Arial" panose="020B0604020202020204" pitchFamily="34" charset="0"/>
-              </a:rPr>
-              <a:t>] ASC) AS [</a:t>
-            </a:r>
-            <a:r>
-              <a:rPr lang="de-DE" b="0" i="0" u="sng" strike="noStrike" dirty="0" err="1">
-                <a:solidFill>
-                  <a:srgbClr val="676667"/>
-                </a:solidFill>
-                <a:effectLst/>
-                <a:latin typeface="Arial" panose="020B0604020202020204" pitchFamily="34" charset="0"/>
-              </a:rPr>
-              <a:t>row</a:t>
-            </a:r>
-            <a:r>
-              <a:rPr lang="de-DE" b="0" i="0" u="none" strike="noStrike" dirty="0" err="1">
-                <a:solidFill>
-                  <a:srgbClr val="676667"/>
-                </a:solidFill>
-                <a:effectLst/>
-                <a:latin typeface="Arial" panose="020B0604020202020204" pitchFamily="34" charset="0"/>
-              </a:rPr>
-              <a:t>number</a:t>
-            </a:r>
-            <a:r>
-              <a:rPr lang="de-DE" b="0" i="0" u="none" strike="noStrike" dirty="0">
-                <a:solidFill>
-                  <a:srgbClr val="676667"/>
-                </a:solidFill>
-                <a:effectLst/>
-                <a:latin typeface="Arial" panose="020B0604020202020204" pitchFamily="34" charset="0"/>
-              </a:rPr>
-              <a:t>]</a:t>
-            </a:r>
-            <a:br>
-              <a:rPr lang="de-DE" b="0" i="0" u="none" strike="noStrike" dirty="0">
-                <a:solidFill>
-                  <a:srgbClr val="676667"/>
-                </a:solidFill>
-                <a:effectLst/>
-                <a:latin typeface="Arial" panose="020B0604020202020204" pitchFamily="34" charset="0"/>
-              </a:rPr>
-            </a:br>
-            <a:r>
-              <a:rPr lang="de-DE" b="0" i="0" u="none" strike="noStrike" dirty="0">
-                <a:solidFill>
-                  <a:srgbClr val="676667"/>
-                </a:solidFill>
-                <a:effectLst/>
-                <a:latin typeface="Arial" panose="020B0604020202020204" pitchFamily="34" charset="0"/>
-              </a:rPr>
-              <a:t>FROM [Betrieb].[Flug] </a:t>
-            </a:r>
-            <a:br>
-              <a:rPr lang="de-DE" b="0" i="0" u="none" strike="noStrike" dirty="0">
-                <a:solidFill>
-                  <a:srgbClr val="676667"/>
-                </a:solidFill>
-                <a:effectLst/>
-                <a:latin typeface="Arial" panose="020B0604020202020204" pitchFamily="34" charset="0"/>
-              </a:rPr>
-            </a:br>
-            <a:r>
-              <a:rPr lang="de-DE" b="0" i="0" u="none" strike="noStrike" dirty="0">
-                <a:solidFill>
-                  <a:srgbClr val="676667"/>
-                </a:solidFill>
-                <a:effectLst/>
-                <a:latin typeface="Arial" panose="020B0604020202020204" pitchFamily="34" charset="0"/>
-              </a:rPr>
-              <a:t>) AS f</a:t>
-            </a:r>
-            <a:br>
-              <a:rPr lang="de-DE" b="0" i="0" u="none" strike="noStrike" dirty="0">
-                <a:solidFill>
-                  <a:srgbClr val="676667"/>
-                </a:solidFill>
-                <a:effectLst/>
-                <a:latin typeface="Arial" panose="020B0604020202020204" pitchFamily="34" charset="0"/>
-              </a:rPr>
-            </a:br>
-            <a:r>
-              <a:rPr lang="de-DE" b="0" i="0" u="none" strike="noStrike" dirty="0">
-                <a:solidFill>
-                  <a:srgbClr val="676667"/>
-                </a:solidFill>
-                <a:effectLst/>
-                <a:latin typeface="Arial" panose="020B0604020202020204" pitchFamily="34" charset="0"/>
-              </a:rPr>
-              <a:t>WHERE f.[</a:t>
-            </a:r>
-            <a:r>
-              <a:rPr lang="de-DE" b="0" i="0" u="none" strike="noStrike" dirty="0" err="1">
-                <a:solidFill>
-                  <a:srgbClr val="676667"/>
-                </a:solidFill>
-                <a:effectLst/>
-                <a:latin typeface="Arial" panose="020B0604020202020204" pitchFamily="34" charset="0"/>
-              </a:rPr>
-              <a:t>row_number</a:t>
-            </a:r>
-            <a:r>
-              <a:rPr lang="de-DE" b="0" i="0" u="none" strike="noStrike" dirty="0">
-                <a:solidFill>
-                  <a:srgbClr val="676667"/>
-                </a:solidFill>
-                <a:effectLst/>
-                <a:latin typeface="Arial" panose="020B0604020202020204" pitchFamily="34" charset="0"/>
-              </a:rPr>
-              <a:t>] &gt; 100</a:t>
-            </a:r>
-            <a:br>
-              <a:rPr lang="de-DE" b="0" i="0" u="none" strike="noStrike" dirty="0">
-                <a:solidFill>
-                  <a:srgbClr val="676667"/>
-                </a:solidFill>
-                <a:effectLst/>
-                <a:latin typeface="Arial" panose="020B0604020202020204" pitchFamily="34" charset="0"/>
-              </a:rPr>
-            </a:br>
-            <a:r>
-              <a:rPr lang="de-DE" b="0" i="0" u="none" strike="noStrike" dirty="0">
-                <a:solidFill>
-                  <a:srgbClr val="676667"/>
-                </a:solidFill>
-                <a:effectLst/>
-                <a:latin typeface="Arial" panose="020B0604020202020204" pitchFamily="34" charset="0"/>
-              </a:rPr>
-              <a:t>ORDER BY f.[</a:t>
-            </a:r>
-            <a:r>
-              <a:rPr lang="de-DE" b="0" i="0" u="none" strike="noStrike" dirty="0" err="1">
-                <a:solidFill>
-                  <a:srgbClr val="676667"/>
-                </a:solidFill>
-                <a:effectLst/>
-                <a:latin typeface="Arial" panose="020B0604020202020204" pitchFamily="34" charset="0"/>
-              </a:rPr>
-              <a:t>FlugNr</a:t>
-            </a:r>
-            <a:r>
-              <a:rPr lang="de-DE" b="0" i="0" u="none" strike="noStrike" dirty="0">
-                <a:solidFill>
-                  <a:srgbClr val="676667"/>
-                </a:solidFill>
-                <a:effectLst/>
-                <a:latin typeface="Arial" panose="020B0604020202020204" pitchFamily="34" charset="0"/>
-              </a:rPr>
-              <a:t>] ASC</a:t>
-            </a:r>
-          </a:p>
-          <a:p>
-            <a:endParaRPr lang="de-AT" b="0" i="0" u="none" strike="noStrike" dirty="0">
-              <a:solidFill>
-                <a:srgbClr val="E8EAED"/>
-              </a:solidFill>
-              <a:effectLst/>
-              <a:latin typeface="Google Sans"/>
-            </a:endParaRPr>
-          </a:p>
-          <a:p>
-            <a:endParaRPr lang="en-US" dirty="0"/>
-          </a:p>
-          <a:p>
             <a:endParaRPr lang="de-AT" dirty="0"/>
           </a:p>
         </p:txBody>
@@ -1984,7 +683,7 @@
           <a:bodyPr/>
           <a:lstStyle/>
           <a:p>
-            <a:endParaRPr lang="en-US" dirty="0"/>
+            <a:endParaRPr lang="de-AT" dirty="0"/>
           </a:p>
         </p:txBody>
       </p:sp>
@@ -2014,7 +713,7 @@
     </p:spTree>
     <p:extLst>
       <p:ext uri="{BB962C8B-B14F-4D97-AF65-F5344CB8AC3E}">
-        <p14:creationId xmlns:p14="http://schemas.microsoft.com/office/powerpoint/2010/main" val="3148690735"/>
+        <p14:creationId xmlns:p14="http://schemas.microsoft.com/office/powerpoint/2010/main" val="1426269777"/>
       </p:ext>
     </p:extLst>
   </p:cSld>
@@ -2098,7 +797,7 @@
     </p:spTree>
     <p:extLst>
       <p:ext uri="{BB962C8B-B14F-4D97-AF65-F5344CB8AC3E}">
-        <p14:creationId xmlns:p14="http://schemas.microsoft.com/office/powerpoint/2010/main" val="1003416568"/>
+        <p14:creationId xmlns:p14="http://schemas.microsoft.com/office/powerpoint/2010/main" val="3148690735"/>
       </p:ext>
     </p:extLst>
   </p:cSld>
@@ -2182,7 +881,175 @@
     </p:spTree>
     <p:extLst>
       <p:ext uri="{BB962C8B-B14F-4D97-AF65-F5344CB8AC3E}">
+        <p14:creationId xmlns:p14="http://schemas.microsoft.com/office/powerpoint/2010/main" val="1003416568"/>
+      </p:ext>
+    </p:extLst>
+  </p:cSld>
+  <p:clrMapOvr>
+    <a:masterClrMapping/>
+  </p:clrMapOvr>
+</p:notes>
+</file>
+
+<file path=ppt/notesSlides/notesSlide6.xml><?xml version="1.0" encoding="utf-8"?>
+<p:notes xmlns:a="http://schemas.openxmlformats.org/drawingml/2006/main" xmlns:r="http://schemas.openxmlformats.org/officeDocument/2006/relationships" xmlns:p="http://schemas.openxmlformats.org/presentationml/2006/main">
+  <p:cSld>
+    <p:spTree>
+      <p:nvGrpSpPr>
+        <p:cNvPr id="1" name=""/>
+        <p:cNvGrpSpPr/>
+        <p:nvPr/>
+      </p:nvGrpSpPr>
+      <p:grpSpPr>
+        <a:xfrm>
+          <a:off x="0" y="0"/>
+          <a:ext cx="0" cy="0"/>
+          <a:chOff x="0" y="0"/>
+          <a:chExt cx="0" cy="0"/>
+        </a:xfrm>
+      </p:grpSpPr>
+      <p:sp>
+        <p:nvSpPr>
+          <p:cNvPr id="2" name="Folienbildplatzhalter 1"/>
+          <p:cNvSpPr>
+            <a:spLocks noGrp="1" noRot="1" noChangeAspect="1"/>
+          </p:cNvSpPr>
+          <p:nvPr>
+            <p:ph type="sldImg"/>
+          </p:nvPr>
+        </p:nvSpPr>
+        <p:spPr/>
+      </p:sp>
+      <p:sp>
+        <p:nvSpPr>
+          <p:cNvPr id="3" name="Notizenplatzhalter 2"/>
+          <p:cNvSpPr>
+            <a:spLocks noGrp="1"/>
+          </p:cNvSpPr>
+          <p:nvPr>
+            <p:ph type="body" idx="1"/>
+          </p:nvPr>
+        </p:nvSpPr>
+        <p:spPr/>
+        <p:txBody>
+          <a:bodyPr/>
+          <a:lstStyle/>
+          <a:p>
+            <a:endParaRPr lang="en-US" dirty="0"/>
+          </a:p>
+        </p:txBody>
+      </p:sp>
+      <p:sp>
+        <p:nvSpPr>
+          <p:cNvPr id="4" name="Foliennummernplatzhalter 3"/>
+          <p:cNvSpPr>
+            <a:spLocks noGrp="1"/>
+          </p:cNvSpPr>
+          <p:nvPr>
+            <p:ph type="sldNum" sz="quarter" idx="5"/>
+          </p:nvPr>
+        </p:nvSpPr>
+        <p:spPr/>
+        <p:txBody>
+          <a:bodyPr/>
+          <a:lstStyle/>
+          <a:p>
+            <a:fld id="{4170B3C4-05EC-42BA-841C-F50750D38CCA}" type="slidenum">
+              <a:rPr lang="en-US" smtClean="0"/>
+              <a:t>6</a:t>
+            </a:fld>
+            <a:endParaRPr lang="en-US"/>
+          </a:p>
+        </p:txBody>
+      </p:sp>
+    </p:spTree>
+    <p:extLst>
+      <p:ext uri="{BB962C8B-B14F-4D97-AF65-F5344CB8AC3E}">
         <p14:creationId xmlns:p14="http://schemas.microsoft.com/office/powerpoint/2010/main" val="72842020"/>
+      </p:ext>
+    </p:extLst>
+  </p:cSld>
+  <p:clrMapOvr>
+    <a:masterClrMapping/>
+  </p:clrMapOvr>
+</p:notes>
+</file>
+
+<file path=ppt/notesSlides/notesSlide7.xml><?xml version="1.0" encoding="utf-8"?>
+<p:notes xmlns:a="http://schemas.openxmlformats.org/drawingml/2006/main" xmlns:r="http://schemas.openxmlformats.org/officeDocument/2006/relationships" xmlns:p="http://schemas.openxmlformats.org/presentationml/2006/main">
+  <p:cSld>
+    <p:spTree>
+      <p:nvGrpSpPr>
+        <p:cNvPr id="1" name=""/>
+        <p:cNvGrpSpPr/>
+        <p:nvPr/>
+      </p:nvGrpSpPr>
+      <p:grpSpPr>
+        <a:xfrm>
+          <a:off x="0" y="0"/>
+          <a:ext cx="0" cy="0"/>
+          <a:chOff x="0" y="0"/>
+          <a:chExt cx="0" cy="0"/>
+        </a:xfrm>
+      </p:grpSpPr>
+      <p:sp>
+        <p:nvSpPr>
+          <p:cNvPr id="2" name="Folienbildplatzhalter 1"/>
+          <p:cNvSpPr>
+            <a:spLocks noGrp="1" noRot="1" noChangeAspect="1"/>
+          </p:cNvSpPr>
+          <p:nvPr>
+            <p:ph type="sldImg"/>
+          </p:nvPr>
+        </p:nvSpPr>
+        <p:spPr/>
+      </p:sp>
+      <p:sp>
+        <p:nvSpPr>
+          <p:cNvPr id="3" name="Notizenplatzhalter 2"/>
+          <p:cNvSpPr>
+            <a:spLocks noGrp="1"/>
+          </p:cNvSpPr>
+          <p:nvPr>
+            <p:ph type="body" idx="1"/>
+          </p:nvPr>
+        </p:nvSpPr>
+        <p:spPr/>
+        <p:txBody>
+          <a:bodyPr/>
+          <a:lstStyle/>
+          <a:p>
+            <a:endParaRPr lang="en-US" dirty="0"/>
+          </a:p>
+        </p:txBody>
+      </p:sp>
+      <p:sp>
+        <p:nvSpPr>
+          <p:cNvPr id="4" name="Foliennummernplatzhalter 3"/>
+          <p:cNvSpPr>
+            <a:spLocks noGrp="1"/>
+          </p:cNvSpPr>
+          <p:nvPr>
+            <p:ph type="sldNum" sz="quarter" idx="5"/>
+          </p:nvPr>
+        </p:nvSpPr>
+        <p:spPr/>
+        <p:txBody>
+          <a:bodyPr/>
+          <a:lstStyle/>
+          <a:p>
+            <a:fld id="{4170B3C4-05EC-42BA-841C-F50750D38CCA}" type="slidenum">
+              <a:rPr lang="en-US" smtClean="0"/>
+              <a:t>7</a:t>
+            </a:fld>
+            <a:endParaRPr lang="en-US"/>
+          </a:p>
+        </p:txBody>
+      </p:sp>
+    </p:spTree>
+    <p:extLst>
+      <p:ext uri="{BB962C8B-B14F-4D97-AF65-F5344CB8AC3E}">
+        <p14:creationId xmlns:p14="http://schemas.microsoft.com/office/powerpoint/2010/main" val="7023730"/>
       </p:ext>
     </p:extLst>
   </p:cSld>
@@ -2341,7 +1208,7 @@
           <a:p>
             <a:fld id="{62A82E45-714E-4678-9BBB-EC059C20D303}" type="datetimeFigureOut">
               <a:rPr lang="en-US" smtClean="0"/>
-              <a:t>11/5/2023</a:t>
+              <a:t>11/6/2023</a:t>
             </a:fld>
             <a:endParaRPr lang="en-US"/>
           </a:p>
@@ -2553,7 +1420,7 @@
           <a:p>
             <a:fld id="{62A82E45-714E-4678-9BBB-EC059C20D303}" type="datetimeFigureOut">
               <a:rPr lang="en-US" smtClean="0"/>
-              <a:t>11/5/2023</a:t>
+              <a:t>11/6/2023</a:t>
             </a:fld>
             <a:endParaRPr lang="en-US"/>
           </a:p>
@@ -2775,7 +1642,7 @@
           <a:p>
             <a:fld id="{62A82E45-714E-4678-9BBB-EC059C20D303}" type="datetimeFigureOut">
               <a:rPr lang="en-US" smtClean="0"/>
-              <a:t>11/5/2023</a:t>
+              <a:t>11/6/2023</a:t>
             </a:fld>
             <a:endParaRPr lang="en-US"/>
           </a:p>
@@ -2987,7 +1854,7 @@
           <a:p>
             <a:fld id="{62A82E45-714E-4678-9BBB-EC059C20D303}" type="datetimeFigureOut">
               <a:rPr lang="en-US" smtClean="0"/>
-              <a:t>11/5/2023</a:t>
+              <a:t>11/6/2023</a:t>
             </a:fld>
             <a:endParaRPr lang="en-US"/>
           </a:p>
@@ -3275,7 +2142,7 @@
           <a:p>
             <a:fld id="{62A82E45-714E-4678-9BBB-EC059C20D303}" type="datetimeFigureOut">
               <a:rPr lang="en-US" smtClean="0"/>
-              <a:t>11/5/2023</a:t>
+              <a:t>11/6/2023</a:t>
             </a:fld>
             <a:endParaRPr lang="en-US"/>
           </a:p>
@@ -3555,7 +2422,7 @@
           <a:p>
             <a:fld id="{62A82E45-714E-4678-9BBB-EC059C20D303}" type="datetimeFigureOut">
               <a:rPr lang="en-US" smtClean="0"/>
-              <a:t>11/5/2023</a:t>
+              <a:t>11/6/2023</a:t>
             </a:fld>
             <a:endParaRPr lang="en-US"/>
           </a:p>
@@ -3982,7 +2849,7 @@
           <a:p>
             <a:fld id="{62A82E45-714E-4678-9BBB-EC059C20D303}" type="datetimeFigureOut">
               <a:rPr lang="en-US" smtClean="0"/>
-              <a:t>11/5/2023</a:t>
+              <a:t>11/6/2023</a:t>
             </a:fld>
             <a:endParaRPr lang="en-US"/>
           </a:p>
@@ -4136,7 +3003,7 @@
           <a:p>
             <a:fld id="{62A82E45-714E-4678-9BBB-EC059C20D303}" type="datetimeFigureOut">
               <a:rPr lang="en-US" smtClean="0"/>
-              <a:t>11/5/2023</a:t>
+              <a:t>11/6/2023</a:t>
             </a:fld>
             <a:endParaRPr lang="en-US"/>
           </a:p>
@@ -4261,7 +3128,7 @@
           <a:p>
             <a:fld id="{62A82E45-714E-4678-9BBB-EC059C20D303}" type="datetimeFigureOut">
               <a:rPr lang="en-US" smtClean="0"/>
-              <a:t>11/5/2023</a:t>
+              <a:t>11/6/2023</a:t>
             </a:fld>
             <a:endParaRPr lang="en-US"/>
           </a:p>
@@ -4586,7 +3453,7 @@
           <a:p>
             <a:fld id="{62A82E45-714E-4678-9BBB-EC059C20D303}" type="datetimeFigureOut">
               <a:rPr lang="en-US" smtClean="0"/>
-              <a:t>11/5/2023</a:t>
+              <a:t>11/6/2023</a:t>
             </a:fld>
             <a:endParaRPr lang="en-US"/>
           </a:p>
@@ -4887,7 +3754,7 @@
           <a:p>
             <a:fld id="{62A82E45-714E-4678-9BBB-EC059C20D303}" type="datetimeFigureOut">
               <a:rPr lang="en-US" smtClean="0"/>
-              <a:t>11/5/2023</a:t>
+              <a:t>11/6/2023</a:t>
             </a:fld>
             <a:endParaRPr lang="en-US"/>
           </a:p>
@@ -5167,7 +4034,7 @@
           <a:p>
             <a:fld id="{62A82E45-714E-4678-9BBB-EC059C20D303}" type="datetimeFigureOut">
               <a:rPr lang="en-US" smtClean="0"/>
-              <a:t>11/5/2023</a:t>
+              <a:t>11/6/2023</a:t>
             </a:fld>
             <a:endParaRPr lang="en-US"/>
           </a:p>
@@ -5669,25 +4536,7 @@
                 </a:solidFill>
                 <a:latin typeface="AppleSystemUIFont"/>
               </a:rPr>
-              <a:t>Was ist </a:t>
-            </a:r>
-            <a:r>
-              <a:rPr lang="de-DE" sz="1800" dirty="0" err="1">
-                <a:solidFill>
-                  <a:srgbClr val="000000"/>
-                </a:solidFill>
-                <a:latin typeface="AppleSystemUIFont"/>
-              </a:rPr>
-              <a:t>Paging</a:t>
-            </a:r>
-            <a:r>
-              <a:rPr lang="de-DE" sz="1800" dirty="0">
-                <a:solidFill>
-                  <a:srgbClr val="000000"/>
-                </a:solidFill>
-                <a:latin typeface="AppleSystemUIFont"/>
-              </a:rPr>
-              <a:t>?</a:t>
+              <a:t>Top-N-Zeilen</a:t>
             </a:r>
           </a:p>
           <a:p>
@@ -6540,25 +5389,7 @@
                 </a:solidFill>
                 <a:latin typeface="AppleSystemUIFont"/>
               </a:rPr>
-              <a:t>Was ist </a:t>
-            </a:r>
-            <a:r>
-              <a:rPr lang="de-DE" sz="4400" dirty="0" err="1">
-                <a:solidFill>
-                  <a:srgbClr val="000000"/>
-                </a:solidFill>
-                <a:latin typeface="AppleSystemUIFont"/>
-              </a:rPr>
-              <a:t>Paging</a:t>
-            </a:r>
-            <a:r>
-              <a:rPr lang="de-DE" sz="4400" dirty="0">
-                <a:solidFill>
-                  <a:srgbClr val="000000"/>
-                </a:solidFill>
-                <a:latin typeface="AppleSystemUIFont"/>
-              </a:rPr>
-              <a:t>?</a:t>
+              <a:t>Top-N-Zeilen</a:t>
             </a:r>
             <a:endParaRPr lang="en-US" dirty="0"/>
           </a:p>
@@ -6582,8 +5413,8 @@
         </p:nvSpPr>
         <p:spPr bwMode="auto">
           <a:xfrm>
-            <a:off x="838200" y="1971101"/>
-            <a:ext cx="11353800" cy="1803571"/>
+            <a:off x="838200" y="1713082"/>
+            <a:ext cx="11353800" cy="2319609"/>
           </a:xfrm>
           <a:prstGeom prst="rect">
             <a:avLst/>
@@ -6633,8 +5464,10 @@
           <a:p>
             <a:r>
               <a:rPr lang="de-AT" dirty="0"/>
-              <a:t>Text</a:t>
-            </a:r>
+              <a:t>Beschränkung auf bestimmte Zeilenzahl</a:t>
+            </a:r>
+          </a:p>
+          <a:p>
             <a:endParaRPr lang="en-US" dirty="0"/>
           </a:p>
           <a:p>
@@ -6803,6 +5636,36 @@
           </a:p>
         </p:txBody>
       </p:sp>
+      <p:pic>
+        <p:nvPicPr>
+          <p:cNvPr id="4" name="Grafik 3">
+            <a:extLst>
+              <a:ext uri="{FF2B5EF4-FFF2-40B4-BE49-F238E27FC236}">
+                <a16:creationId xmlns:a16="http://schemas.microsoft.com/office/drawing/2014/main" id="{20F281A8-ED04-C289-6713-E88AEB83C524}"/>
+              </a:ext>
+            </a:extLst>
+          </p:cNvPr>
+          <p:cNvPicPr>
+            <a:picLocks noChangeAspect="1"/>
+          </p:cNvPicPr>
+          <p:nvPr/>
+        </p:nvPicPr>
+        <p:blipFill>
+          <a:blip r:embed="rId3"/>
+          <a:stretch>
+            <a:fillRect/>
+          </a:stretch>
+        </p:blipFill>
+        <p:spPr>
+          <a:xfrm>
+            <a:off x="851452" y="2325518"/>
+            <a:ext cx="7610475" cy="2819400"/>
+          </a:xfrm>
+          <a:prstGeom prst="rect">
+            <a:avLst/>
+          </a:prstGeom>
+        </p:spPr>
+      </p:pic>
     </p:spTree>
     <p:extLst>
       <p:ext uri="{BB962C8B-B14F-4D97-AF65-F5344CB8AC3E}">
@@ -6918,6 +5781,88 @@
                             </p:childTnLst>
                           </p:cTn>
                         </p:par>
+                        <p:par>
+                          <p:cTn id="10" fill="hold">
+                            <p:stCondLst>
+                              <p:cond delay="1000"/>
+                            </p:stCondLst>
+                            <p:childTnLst>
+                              <p:par>
+                                <p:cTn id="11" presetID="2" presetClass="entr" presetSubtype="4" fill="hold" nodeType="afterEffect">
+                                  <p:stCondLst>
+                                    <p:cond delay="2000"/>
+                                  </p:stCondLst>
+                                  <p:childTnLst>
+                                    <p:set>
+                                      <p:cBhvr>
+                                        <p:cTn id="12" dur="1" fill="hold">
+                                          <p:stCondLst>
+                                            <p:cond delay="0"/>
+                                          </p:stCondLst>
+                                        </p:cTn>
+                                        <p:tgtEl>
+                                          <p:spTgt spid="4"/>
+                                        </p:tgtEl>
+                                        <p:attrNameLst>
+                                          <p:attrName>style.visibility</p:attrName>
+                                        </p:attrNameLst>
+                                      </p:cBhvr>
+                                      <p:to>
+                                        <p:strVal val="visible"/>
+                                      </p:to>
+                                    </p:set>
+                                    <p:anim calcmode="lin" valueType="num">
+                                      <p:cBhvr additive="base">
+                                        <p:cTn id="13" dur="500" fill="hold"/>
+                                        <p:tgtEl>
+                                          <p:spTgt spid="4"/>
+                                        </p:tgtEl>
+                                        <p:attrNameLst>
+                                          <p:attrName>ppt_x</p:attrName>
+                                        </p:attrNameLst>
+                                      </p:cBhvr>
+                                      <p:tavLst>
+                                        <p:tav tm="0">
+                                          <p:val>
+                                            <p:strVal val="#ppt_x"/>
+                                          </p:val>
+                                        </p:tav>
+                                        <p:tav tm="100000">
+                                          <p:val>
+                                            <p:strVal val="#ppt_x"/>
+                                          </p:val>
+                                        </p:tav>
+                                      </p:tavLst>
+                                    </p:anim>
+                                    <p:anim calcmode="lin" valueType="num">
+                                      <p:cBhvr additive="base">
+                                        <p:cTn id="14" dur="500" fill="hold"/>
+                                        <p:tgtEl>
+                                          <p:spTgt spid="4"/>
+                                        </p:tgtEl>
+                                        <p:attrNameLst>
+                                          <p:attrName>ppt_y</p:attrName>
+                                        </p:attrNameLst>
+                                      </p:cBhvr>
+                                      <p:tavLst>
+                                        <p:tav tm="0">
+                                          <p:val>
+                                            <p:strVal val="1+#ppt_h/2"/>
+                                          </p:val>
+                                        </p:tav>
+                                        <p:tav tm="100000">
+                                          <p:val>
+                                            <p:strVal val="#ppt_y"/>
+                                          </p:val>
+                                        </p:tav>
+                                      </p:tavLst>
+                                    </p:anim>
+                                  </p:childTnLst>
+                                </p:cTn>
+                              </p:par>
+                            </p:childTnLst>
+                          </p:cTn>
+                        </p:par>
                       </p:childTnLst>
                     </p:cTn>
                   </p:par>
@@ -6972,6 +5917,557 @@
           <p:cNvPr id="2" name="Titel 1">
             <a:extLst>
               <a:ext uri="{FF2B5EF4-FFF2-40B4-BE49-F238E27FC236}">
+                <a16:creationId xmlns:a16="http://schemas.microsoft.com/office/drawing/2014/main" id="{FBBF6712-CF2F-CCFB-88C9-B2834CF01477}"/>
+              </a:ext>
+            </a:extLst>
+          </p:cNvPr>
+          <p:cNvSpPr>
+            <a:spLocks noGrp="1"/>
+          </p:cNvSpPr>
+          <p:nvPr>
+            <p:ph type="title"/>
+          </p:nvPr>
+        </p:nvSpPr>
+        <p:spPr/>
+        <p:txBody>
+          <a:bodyPr/>
+          <a:lstStyle/>
+          <a:p>
+            <a:r>
+              <a:rPr lang="de-DE" sz="4400" dirty="0">
+                <a:solidFill>
+                  <a:srgbClr val="000000"/>
+                </a:solidFill>
+                <a:latin typeface="AppleSystemUIFont"/>
+              </a:rPr>
+              <a:t>Top-N-Zeilen</a:t>
+            </a:r>
+            <a:endParaRPr lang="en-US" dirty="0"/>
+          </a:p>
+        </p:txBody>
+      </p:sp>
+      <p:sp>
+        <p:nvSpPr>
+          <p:cNvPr id="5" name="Rectangle 2">
+            <a:extLst>
+              <a:ext uri="{FF2B5EF4-FFF2-40B4-BE49-F238E27FC236}">
+                <a16:creationId xmlns:a16="http://schemas.microsoft.com/office/drawing/2014/main" id="{28A07D40-036E-CD78-7364-421C1115DDD1}"/>
+              </a:ext>
+            </a:extLst>
+          </p:cNvPr>
+          <p:cNvSpPr>
+            <a:spLocks noGrp="1" noChangeArrowheads="1"/>
+          </p:cNvSpPr>
+          <p:nvPr>
+            <p:ph idx="1"/>
+          </p:nvPr>
+        </p:nvSpPr>
+        <p:spPr bwMode="auto">
+          <a:xfrm>
+            <a:off x="838200" y="1713082"/>
+            <a:ext cx="11353800" cy="2319609"/>
+          </a:xfrm>
+          <a:prstGeom prst="rect">
+            <a:avLst/>
+          </a:prstGeom>
+          <a:noFill/>
+          <a:ln>
+            <a:noFill/>
+          </a:ln>
+          <a:effectLst/>
+          <a:extLst>
+            <a:ext uri="{909E8E84-426E-40DD-AFC4-6F175D3DCCD1}">
+              <a14:hiddenFill xmlns:a14="http://schemas.microsoft.com/office/drawing/2010/main">
+                <a:solidFill>
+                  <a:schemeClr val="accent1"/>
+                </a:solidFill>
+              </a14:hiddenFill>
+            </a:ext>
+            <a:ext uri="{91240B29-F687-4F45-9708-019B960494DF}">
+              <a14:hiddenLine xmlns:a14="http://schemas.microsoft.com/office/drawing/2010/main" w="9525">
+                <a:solidFill>
+                  <a:schemeClr val="tx1"/>
+                </a:solidFill>
+                <a:miter lim="800000"/>
+                <a:headEnd/>
+                <a:tailEnd/>
+              </a14:hiddenLine>
+            </a:ext>
+            <a:ext uri="{AF507438-7753-43E0-B8FC-AC1667EBCBE1}">
+              <a14:hiddenEffects xmlns:a14="http://schemas.microsoft.com/office/drawing/2010/main">
+                <a:effectLst>
+                  <a:outerShdw dist="35921" dir="2700000" algn="ctr" rotWithShape="0">
+                    <a:schemeClr val="bg2"/>
+                  </a:outerShdw>
+                </a:effectLst>
+              </a14:hiddenEffects>
+            </a:ext>
+          </a:extLst>
+        </p:spPr>
+        <p:txBody>
+          <a:bodyPr vert="horz" wrap="square" lIns="91440" tIns="45720" rIns="91440" bIns="45720" numCol="1" anchor="ctr" anchorCtr="0" compatLnSpc="1">
+            <a:prstTxWarp prst="textNoShape">
+              <a:avLst/>
+            </a:prstTxWarp>
+            <a:spAutoFit/>
+          </a:bodyPr>
+          <a:lstStyle/>
+          <a:p>
+            <a:r>
+              <a:rPr lang="de-AT" dirty="0"/>
+              <a:t>Die Tabelle muss nicht vollständig gelesen werden</a:t>
+            </a:r>
+          </a:p>
+          <a:p>
+            <a:endParaRPr lang="en-US" dirty="0"/>
+          </a:p>
+          <a:p>
+            <a:pPr marL="0" marR="0" lvl="0" indent="0" algn="l" defTabSz="914400" rtl="0" eaLnBrk="0" fontAlgn="base" latinLnBrk="0" hangingPunct="0">
+              <a:lnSpc>
+                <a:spcPct val="100000"/>
+              </a:lnSpc>
+              <a:spcBef>
+                <a:spcPct val="0"/>
+              </a:spcBef>
+              <a:spcAft>
+                <a:spcPct val="0"/>
+              </a:spcAft>
+              <a:buClrTx/>
+              <a:buSzTx/>
+              <a:buFontTx/>
+              <a:buNone/>
+              <a:tabLst/>
+            </a:pPr>
+            <a:endParaRPr lang="en-US" sz="1800" dirty="0">
+              <a:solidFill>
+                <a:prstClr val="black"/>
+              </a:solidFill>
+              <a:latin typeface="AppleSystemUIFont"/>
+            </a:endParaRPr>
+          </a:p>
+          <a:p>
+            <a:pPr marL="0" marR="0" lvl="0" indent="0" algn="l" defTabSz="914400" rtl="0" eaLnBrk="0" fontAlgn="base" latinLnBrk="0" hangingPunct="0">
+              <a:lnSpc>
+                <a:spcPct val="100000"/>
+              </a:lnSpc>
+              <a:spcBef>
+                <a:spcPct val="0"/>
+              </a:spcBef>
+              <a:spcAft>
+                <a:spcPct val="0"/>
+              </a:spcAft>
+              <a:buClrTx/>
+              <a:buSzTx/>
+              <a:buFontTx/>
+              <a:buNone/>
+              <a:tabLst/>
+            </a:pPr>
+            <a:endParaRPr kumimoji="0" lang="en-US" altLang="en-US" sz="1800" b="0" i="0" u="none" strike="noStrike" cap="none" normalizeH="0" baseline="0" dirty="0">
+              <a:ln>
+                <a:noFill/>
+              </a:ln>
+              <a:solidFill>
+                <a:prstClr val="black"/>
+              </a:solidFill>
+              <a:effectLst/>
+              <a:latin typeface="AppleSystemUIFont"/>
+            </a:endParaRPr>
+          </a:p>
+          <a:p>
+            <a:pPr marL="0" marR="0" lvl="0" indent="0" algn="l" defTabSz="914400" rtl="0" eaLnBrk="0" fontAlgn="base" latinLnBrk="0" hangingPunct="0">
+              <a:lnSpc>
+                <a:spcPct val="100000"/>
+              </a:lnSpc>
+              <a:spcBef>
+                <a:spcPct val="0"/>
+              </a:spcBef>
+              <a:spcAft>
+                <a:spcPct val="0"/>
+              </a:spcAft>
+              <a:buClrTx/>
+              <a:buSzTx/>
+              <a:buFontTx/>
+              <a:buNone/>
+              <a:tabLst/>
+            </a:pPr>
+            <a:endParaRPr kumimoji="0" lang="en-US" altLang="en-US" sz="1000" b="0" i="0" u="none" strike="noStrike" cap="none" normalizeH="0" baseline="0" dirty="0">
+              <a:ln>
+                <a:noFill/>
+              </a:ln>
+              <a:solidFill>
+                <a:schemeClr val="tx1"/>
+              </a:solidFill>
+              <a:effectLst/>
+              <a:latin typeface="FontinSans"/>
+            </a:endParaRPr>
+          </a:p>
+          <a:p>
+            <a:pPr marL="0" marR="0" lvl="0" indent="0" algn="l" defTabSz="914400" rtl="0" eaLnBrk="0" fontAlgn="base" latinLnBrk="0" hangingPunct="0">
+              <a:lnSpc>
+                <a:spcPct val="100000"/>
+              </a:lnSpc>
+              <a:spcBef>
+                <a:spcPct val="0"/>
+              </a:spcBef>
+              <a:spcAft>
+                <a:spcPct val="0"/>
+              </a:spcAft>
+              <a:buClrTx/>
+              <a:buSzTx/>
+              <a:buFontTx/>
+              <a:buNone/>
+              <a:tabLst/>
+            </a:pPr>
+            <a:endParaRPr lang="en-US" altLang="en-US" sz="1000" i="1" dirty="0">
+              <a:latin typeface="FontinSans"/>
+            </a:endParaRPr>
+          </a:p>
+          <a:p>
+            <a:pPr marL="0" marR="0" lvl="0" indent="0" algn="l" defTabSz="914400" rtl="0" eaLnBrk="0" fontAlgn="base" latinLnBrk="0" hangingPunct="0">
+              <a:lnSpc>
+                <a:spcPct val="100000"/>
+              </a:lnSpc>
+              <a:spcBef>
+                <a:spcPct val="0"/>
+              </a:spcBef>
+              <a:spcAft>
+                <a:spcPct val="0"/>
+              </a:spcAft>
+              <a:buClrTx/>
+              <a:buSzTx/>
+              <a:buFontTx/>
+              <a:buNone/>
+              <a:tabLst/>
+            </a:pPr>
+            <a:endParaRPr lang="en-US" altLang="en-US" sz="1000" dirty="0">
+              <a:latin typeface="FontinSans"/>
+            </a:endParaRPr>
+          </a:p>
+          <a:p>
+            <a:pPr marL="0" marR="0" lvl="0" indent="0" algn="l" defTabSz="914400" rtl="0" eaLnBrk="0" fontAlgn="base" latinLnBrk="0" hangingPunct="0">
+              <a:lnSpc>
+                <a:spcPct val="100000"/>
+              </a:lnSpc>
+              <a:spcBef>
+                <a:spcPct val="0"/>
+              </a:spcBef>
+              <a:spcAft>
+                <a:spcPct val="0"/>
+              </a:spcAft>
+              <a:buClrTx/>
+              <a:buSzTx/>
+              <a:buFontTx/>
+              <a:buNone/>
+              <a:tabLst/>
+            </a:pPr>
+            <a:endParaRPr lang="en-US" altLang="en-US" sz="1000" dirty="0">
+              <a:latin typeface="FontinSans"/>
+            </a:endParaRPr>
+          </a:p>
+          <a:p>
+            <a:pPr marL="0" marR="0" lvl="0" indent="0" algn="l" defTabSz="914400" rtl="0" eaLnBrk="0" fontAlgn="base" latinLnBrk="0" hangingPunct="0">
+              <a:lnSpc>
+                <a:spcPct val="100000"/>
+              </a:lnSpc>
+              <a:spcBef>
+                <a:spcPct val="0"/>
+              </a:spcBef>
+              <a:spcAft>
+                <a:spcPct val="0"/>
+              </a:spcAft>
+              <a:buClrTx/>
+              <a:buSzTx/>
+              <a:buFontTx/>
+              <a:buNone/>
+              <a:tabLst/>
+            </a:pPr>
+            <a:endParaRPr lang="en-US" altLang="en-US" sz="1000" dirty="0">
+              <a:latin typeface="FontinSans"/>
+            </a:endParaRPr>
+          </a:p>
+        </p:txBody>
+      </p:sp>
+      <p:pic>
+        <p:nvPicPr>
+          <p:cNvPr id="6" name="Grafik 5">
+            <a:extLst>
+              <a:ext uri="{FF2B5EF4-FFF2-40B4-BE49-F238E27FC236}">
+                <a16:creationId xmlns:a16="http://schemas.microsoft.com/office/drawing/2014/main" id="{50057710-3CD5-DC6D-AB9B-E50C54D5D5EE}"/>
+              </a:ext>
+            </a:extLst>
+          </p:cNvPr>
+          <p:cNvPicPr>
+            <a:picLocks noChangeAspect="1"/>
+          </p:cNvPicPr>
+          <p:nvPr/>
+        </p:nvPicPr>
+        <p:blipFill>
+          <a:blip r:embed="rId3"/>
+          <a:stretch>
+            <a:fillRect/>
+          </a:stretch>
+        </p:blipFill>
+        <p:spPr>
+          <a:xfrm>
+            <a:off x="838200" y="2294693"/>
+            <a:ext cx="11173510" cy="4198182"/>
+          </a:xfrm>
+          <a:prstGeom prst="rect">
+            <a:avLst/>
+          </a:prstGeom>
+        </p:spPr>
+      </p:pic>
+    </p:spTree>
+    <p:extLst>
+      <p:ext uri="{BB962C8B-B14F-4D97-AF65-F5344CB8AC3E}">
+        <p14:creationId xmlns:p14="http://schemas.microsoft.com/office/powerpoint/2010/main" val="368826729"/>
+      </p:ext>
+    </p:extLst>
+  </p:cSld>
+  <p:clrMapOvr>
+    <a:masterClrMapping/>
+  </p:clrMapOvr>
+  <mc:AlternateContent xmlns:mc="http://schemas.openxmlformats.org/markup-compatibility/2006">
+    <mc:Choice xmlns:p14="http://schemas.microsoft.com/office/powerpoint/2010/main" Requires="p14">
+      <p:transition spd="slow" p14:dur="1500">
+        <p:split orient="vert"/>
+      </p:transition>
+    </mc:Choice>
+    <mc:Fallback>
+      <p:transition spd="slow">
+        <p:split orient="vert"/>
+      </p:transition>
+    </mc:Fallback>
+  </mc:AlternateContent>
+  <p:timing>
+    <p:tnLst>
+      <p:par>
+        <p:cTn id="1" dur="indefinite" restart="never" nodeType="tmRoot">
+          <p:childTnLst>
+            <p:seq concurrent="1" nextAc="seek">
+              <p:cTn id="2" dur="indefinite" nodeType="mainSeq">
+                <p:childTnLst>
+                  <p:par>
+                    <p:cTn id="3" fill="hold">
+                      <p:stCondLst>
+                        <p:cond delay="indefinite"/>
+                        <p:cond evt="onBegin" delay="0">
+                          <p:tn val="2"/>
+                        </p:cond>
+                      </p:stCondLst>
+                      <p:childTnLst>
+                        <p:par>
+                          <p:cTn id="4" fill="hold">
+                            <p:stCondLst>
+                              <p:cond delay="0"/>
+                            </p:stCondLst>
+                            <p:childTnLst>
+                              <p:par>
+                                <p:cTn id="5" presetID="1" presetClass="entr" presetSubtype="0" fill="hold" grpId="0" nodeType="afterEffect">
+                                  <p:stCondLst>
+                                    <p:cond delay="0"/>
+                                  </p:stCondLst>
+                                  <p:childTnLst>
+                                    <p:set>
+                                      <p:cBhvr>
+                                        <p:cTn id="6" dur="1" fill="hold">
+                                          <p:stCondLst>
+                                            <p:cond delay="0"/>
+                                          </p:stCondLst>
+                                        </p:cTn>
+                                        <p:tgtEl>
+                                          <p:spTgt spid="2"/>
+                                        </p:tgtEl>
+                                        <p:attrNameLst>
+                                          <p:attrName>style.visibility</p:attrName>
+                                        </p:attrNameLst>
+                                      </p:cBhvr>
+                                      <p:to>
+                                        <p:strVal val="visible"/>
+                                      </p:to>
+                                    </p:set>
+                                  </p:childTnLst>
+                                </p:cTn>
+                              </p:par>
+                            </p:childTnLst>
+                          </p:cTn>
+                        </p:par>
+                        <p:par>
+                          <p:cTn id="7" fill="hold">
+                            <p:stCondLst>
+                              <p:cond delay="0"/>
+                            </p:stCondLst>
+                            <p:childTnLst>
+                              <p:par>
+                                <p:cTn id="8" presetID="1" presetClass="entr" presetSubtype="0" fill="hold" grpId="0" nodeType="afterEffect">
+                                  <p:stCondLst>
+                                    <p:cond delay="1000"/>
+                                  </p:stCondLst>
+                                  <p:childTnLst>
+                                    <p:set>
+                                      <p:cBhvr>
+                                        <p:cTn id="9" dur="1" fill="hold">
+                                          <p:stCondLst>
+                                            <p:cond delay="0"/>
+                                          </p:stCondLst>
+                                        </p:cTn>
+                                        <p:tgtEl>
+                                          <p:spTgt spid="5">
+                                            <p:txEl>
+                                              <p:pRg st="0" end="0"/>
+                                            </p:txEl>
+                                          </p:spTgt>
+                                        </p:tgtEl>
+                                        <p:attrNameLst>
+                                          <p:attrName>style.visibility</p:attrName>
+                                        </p:attrNameLst>
+                                      </p:cBhvr>
+                                      <p:to>
+                                        <p:strVal val="visible"/>
+                                      </p:to>
+                                    </p:set>
+                                  </p:childTnLst>
+                                </p:cTn>
+                              </p:par>
+                            </p:childTnLst>
+                          </p:cTn>
+                        </p:par>
+                        <p:par>
+                          <p:cTn id="10" fill="hold">
+                            <p:stCondLst>
+                              <p:cond delay="1000"/>
+                            </p:stCondLst>
+                            <p:childTnLst>
+                              <p:par>
+                                <p:cTn id="11" presetID="2" presetClass="entr" presetSubtype="4" fill="hold" nodeType="afterEffect">
+                                  <p:stCondLst>
+                                    <p:cond delay="2000"/>
+                                  </p:stCondLst>
+                                  <p:childTnLst>
+                                    <p:set>
+                                      <p:cBhvr>
+                                        <p:cTn id="12" dur="1" fill="hold">
+                                          <p:stCondLst>
+                                            <p:cond delay="0"/>
+                                          </p:stCondLst>
+                                        </p:cTn>
+                                        <p:tgtEl>
+                                          <p:spTgt spid="6"/>
+                                        </p:tgtEl>
+                                        <p:attrNameLst>
+                                          <p:attrName>style.visibility</p:attrName>
+                                        </p:attrNameLst>
+                                      </p:cBhvr>
+                                      <p:to>
+                                        <p:strVal val="visible"/>
+                                      </p:to>
+                                    </p:set>
+                                    <p:anim calcmode="lin" valueType="num">
+                                      <p:cBhvr additive="base">
+                                        <p:cTn id="13" dur="500" fill="hold"/>
+                                        <p:tgtEl>
+                                          <p:spTgt spid="6"/>
+                                        </p:tgtEl>
+                                        <p:attrNameLst>
+                                          <p:attrName>ppt_x</p:attrName>
+                                        </p:attrNameLst>
+                                      </p:cBhvr>
+                                      <p:tavLst>
+                                        <p:tav tm="0">
+                                          <p:val>
+                                            <p:strVal val="#ppt_x"/>
+                                          </p:val>
+                                        </p:tav>
+                                        <p:tav tm="100000">
+                                          <p:val>
+                                            <p:strVal val="#ppt_x"/>
+                                          </p:val>
+                                        </p:tav>
+                                      </p:tavLst>
+                                    </p:anim>
+                                    <p:anim calcmode="lin" valueType="num">
+                                      <p:cBhvr additive="base">
+                                        <p:cTn id="14" dur="500" fill="hold"/>
+                                        <p:tgtEl>
+                                          <p:spTgt spid="6"/>
+                                        </p:tgtEl>
+                                        <p:attrNameLst>
+                                          <p:attrName>ppt_y</p:attrName>
+                                        </p:attrNameLst>
+                                      </p:cBhvr>
+                                      <p:tavLst>
+                                        <p:tav tm="0">
+                                          <p:val>
+                                            <p:strVal val="1+#ppt_h/2"/>
+                                          </p:val>
+                                        </p:tav>
+                                        <p:tav tm="100000">
+                                          <p:val>
+                                            <p:strVal val="#ppt_y"/>
+                                          </p:val>
+                                        </p:tav>
+                                      </p:tavLst>
+                                    </p:anim>
+                                  </p:childTnLst>
+                                </p:cTn>
+                              </p:par>
+                            </p:childTnLst>
+                          </p:cTn>
+                        </p:par>
+                      </p:childTnLst>
+                    </p:cTn>
+                  </p:par>
+                </p:childTnLst>
+              </p:cTn>
+              <p:prevCondLst>
+                <p:cond evt="onPrev" delay="0">
+                  <p:tgtEl>
+                    <p:sldTgt/>
+                  </p:tgtEl>
+                </p:cond>
+              </p:prevCondLst>
+              <p:nextCondLst>
+                <p:cond evt="onNext" delay="0">
+                  <p:tgtEl>
+                    <p:sldTgt/>
+                  </p:tgtEl>
+                </p:cond>
+              </p:nextCondLst>
+            </p:seq>
+          </p:childTnLst>
+        </p:cTn>
+      </p:par>
+    </p:tnLst>
+    <p:bldLst>
+      <p:bldP spid="2" grpId="0"/>
+      <p:bldP spid="5" grpId="0" uiExpand="1" build="p"/>
+    </p:bldLst>
+  </p:timing>
+</p:sld>
+</file>
+
+<file path=ppt/slides/slide4.xml><?xml version="1.0" encoding="utf-8"?>
+<p:sld xmlns:a="http://schemas.openxmlformats.org/drawingml/2006/main" xmlns:r="http://schemas.openxmlformats.org/officeDocument/2006/relationships" xmlns:p="http://schemas.openxmlformats.org/presentationml/2006/main">
+  <p:cSld>
+    <p:spTree>
+      <p:nvGrpSpPr>
+        <p:cNvPr id="1" name=""/>
+        <p:cNvGrpSpPr/>
+        <p:nvPr/>
+      </p:nvGrpSpPr>
+      <p:grpSpPr>
+        <a:xfrm>
+          <a:off x="0" y="0"/>
+          <a:ext cx="0" cy="0"/>
+          <a:chOff x="0" y="0"/>
+          <a:chExt cx="0" cy="0"/>
+        </a:xfrm>
+      </p:grpSpPr>
+      <p:sp>
+        <p:nvSpPr>
+          <p:cNvPr id="2" name="Titel 1">
+            <a:extLst>
+              <a:ext uri="{FF2B5EF4-FFF2-40B4-BE49-F238E27FC236}">
                 <a16:creationId xmlns:a16="http://schemas.microsoft.com/office/drawing/2014/main" id="{FA3A972D-933B-C180-D4AA-3ECFD5AC9CA4}"/>
               </a:ext>
             </a:extLst>
@@ -7023,12 +6519,42 @@
           <a:p>
             <a:r>
               <a:rPr lang="de-AT" dirty="0"/>
-              <a:t>Text</a:t>
+              <a:t>ROWNUM nummeriert alle Zeilen sequenziell ( z.B. 1,2,3,4,5 )</a:t>
             </a:r>
             <a:endParaRPr lang="en-US" dirty="0"/>
           </a:p>
         </p:txBody>
       </p:sp>
+      <p:pic>
+        <p:nvPicPr>
+          <p:cNvPr id="5" name="Grafik 4">
+            <a:extLst>
+              <a:ext uri="{FF2B5EF4-FFF2-40B4-BE49-F238E27FC236}">
+                <a16:creationId xmlns:a16="http://schemas.microsoft.com/office/drawing/2014/main" id="{E8C02728-50A7-F526-8454-F99FF4A2D11F}"/>
+              </a:ext>
+            </a:extLst>
+          </p:cNvPr>
+          <p:cNvPicPr>
+            <a:picLocks noChangeAspect="1"/>
+          </p:cNvPicPr>
+          <p:nvPr/>
+        </p:nvPicPr>
+        <p:blipFill>
+          <a:blip r:embed="rId3"/>
+          <a:stretch>
+            <a:fillRect/>
+          </a:stretch>
+        </p:blipFill>
+        <p:spPr>
+          <a:xfrm>
+            <a:off x="838200" y="2454456"/>
+            <a:ext cx="9240078" cy="4060567"/>
+          </a:xfrm>
+          <a:prstGeom prst="rect">
+            <a:avLst/>
+          </a:prstGeom>
+        </p:spPr>
+      </p:pic>
     </p:spTree>
     <p:extLst>
       <p:ext uri="{BB962C8B-B14F-4D97-AF65-F5344CB8AC3E}">
@@ -7144,6 +6670,88 @@
                             </p:childTnLst>
                           </p:cTn>
                         </p:par>
+                        <p:par>
+                          <p:cTn id="10" fill="hold">
+                            <p:stCondLst>
+                              <p:cond delay="1000"/>
+                            </p:stCondLst>
+                            <p:childTnLst>
+                              <p:par>
+                                <p:cTn id="11" presetID="2" presetClass="entr" presetSubtype="4" fill="hold" nodeType="afterEffect">
+                                  <p:stCondLst>
+                                    <p:cond delay="2000"/>
+                                  </p:stCondLst>
+                                  <p:childTnLst>
+                                    <p:set>
+                                      <p:cBhvr>
+                                        <p:cTn id="12" dur="1" fill="hold">
+                                          <p:stCondLst>
+                                            <p:cond delay="0"/>
+                                          </p:stCondLst>
+                                        </p:cTn>
+                                        <p:tgtEl>
+                                          <p:spTgt spid="5"/>
+                                        </p:tgtEl>
+                                        <p:attrNameLst>
+                                          <p:attrName>style.visibility</p:attrName>
+                                        </p:attrNameLst>
+                                      </p:cBhvr>
+                                      <p:to>
+                                        <p:strVal val="visible"/>
+                                      </p:to>
+                                    </p:set>
+                                    <p:anim calcmode="lin" valueType="num">
+                                      <p:cBhvr additive="base">
+                                        <p:cTn id="13" dur="500" fill="hold"/>
+                                        <p:tgtEl>
+                                          <p:spTgt spid="5"/>
+                                        </p:tgtEl>
+                                        <p:attrNameLst>
+                                          <p:attrName>ppt_x</p:attrName>
+                                        </p:attrNameLst>
+                                      </p:cBhvr>
+                                      <p:tavLst>
+                                        <p:tav tm="0">
+                                          <p:val>
+                                            <p:strVal val="#ppt_x"/>
+                                          </p:val>
+                                        </p:tav>
+                                        <p:tav tm="100000">
+                                          <p:val>
+                                            <p:strVal val="#ppt_x"/>
+                                          </p:val>
+                                        </p:tav>
+                                      </p:tavLst>
+                                    </p:anim>
+                                    <p:anim calcmode="lin" valueType="num">
+                                      <p:cBhvr additive="base">
+                                        <p:cTn id="14" dur="500" fill="hold"/>
+                                        <p:tgtEl>
+                                          <p:spTgt spid="5"/>
+                                        </p:tgtEl>
+                                        <p:attrNameLst>
+                                          <p:attrName>ppt_y</p:attrName>
+                                        </p:attrNameLst>
+                                      </p:cBhvr>
+                                      <p:tavLst>
+                                        <p:tav tm="0">
+                                          <p:val>
+                                            <p:strVal val="1+#ppt_h/2"/>
+                                          </p:val>
+                                        </p:tav>
+                                        <p:tav tm="100000">
+                                          <p:val>
+                                            <p:strVal val="#ppt_y"/>
+                                          </p:val>
+                                        </p:tav>
+                                      </p:tavLst>
+                                    </p:anim>
+                                  </p:childTnLst>
+                                </p:cTn>
+                              </p:par>
+                            </p:childTnLst>
+                          </p:cTn>
+                        </p:par>
                       </p:childTnLst>
                     </p:cTn>
                   </p:par>
@@ -7176,7 +6784,7 @@
 </p:sld>
 </file>
 
-<file path=ppt/slides/slide4.xml><?xml version="1.0" encoding="utf-8"?>
+<file path=ppt/slides/slide5.xml><?xml version="1.0" encoding="utf-8"?>
 <p:sld xmlns:a="http://schemas.openxmlformats.org/drawingml/2006/main" xmlns:r="http://schemas.openxmlformats.org/officeDocument/2006/relationships" xmlns:p="http://schemas.openxmlformats.org/presentationml/2006/main">
   <p:cSld>
     <p:spTree>
@@ -7221,7 +6829,7 @@
                 </a:solidFill>
                 <a:latin typeface="AppleSystemUIFont"/>
               </a:rPr>
-              <a:t>OFFSET / FETCH FIRST</a:t>
+              <a:t>OFFSET / FETCH FIRST </a:t>
             </a:r>
           </a:p>
         </p:txBody>
@@ -7254,7 +6862,13 @@
           <a:p>
             <a:r>
               <a:rPr lang="de-AT" dirty="0"/>
-              <a:t>Text</a:t>
+              <a:t>Mit OFFSET gibt man die Zeilen zum Überspringen an</a:t>
+            </a:r>
+          </a:p>
+          <a:p>
+            <a:r>
+              <a:rPr lang="de-AT" dirty="0"/>
+              <a:t>Mit FETCH FIRST … ONLY gibt man die Menge zum Bewerten an</a:t>
             </a:r>
           </a:p>
           <a:p>
@@ -7271,6 +6885,36 @@
           </a:p>
         </p:txBody>
       </p:sp>
+      <p:pic>
+        <p:nvPicPr>
+          <p:cNvPr id="5" name="Grafik 4">
+            <a:extLst>
+              <a:ext uri="{FF2B5EF4-FFF2-40B4-BE49-F238E27FC236}">
+                <a16:creationId xmlns:a16="http://schemas.microsoft.com/office/drawing/2014/main" id="{B928AEBF-6D0D-B818-A635-A02AAE61DE90}"/>
+              </a:ext>
+            </a:extLst>
+          </p:cNvPr>
+          <p:cNvPicPr>
+            <a:picLocks noChangeAspect="1"/>
+          </p:cNvPicPr>
+          <p:nvPr/>
+        </p:nvPicPr>
+        <p:blipFill>
+          <a:blip r:embed="rId3"/>
+          <a:stretch>
+            <a:fillRect/>
+          </a:stretch>
+        </p:blipFill>
+        <p:spPr>
+          <a:xfrm>
+            <a:off x="1036983" y="2883176"/>
+            <a:ext cx="8246165" cy="3373882"/>
+          </a:xfrm>
+          <a:prstGeom prst="rect">
+            <a:avLst/>
+          </a:prstGeom>
+        </p:spPr>
+      </p:pic>
     </p:spTree>
     <p:extLst>
       <p:ext uri="{BB962C8B-B14F-4D97-AF65-F5344CB8AC3E}">
@@ -7386,6 +7030,128 @@
                             </p:childTnLst>
                           </p:cTn>
                         </p:par>
+                        <p:par>
+                          <p:cTn id="10" fill="hold">
+                            <p:stCondLst>
+                              <p:cond delay="1000"/>
+                            </p:stCondLst>
+                            <p:childTnLst>
+                              <p:par>
+                                <p:cTn id="11" presetID="1" presetClass="entr" presetSubtype="0" fill="hold" grpId="0" nodeType="afterEffect">
+                                  <p:stCondLst>
+                                    <p:cond delay="1000"/>
+                                  </p:stCondLst>
+                                  <p:childTnLst>
+                                    <p:set>
+                                      <p:cBhvr>
+                                        <p:cTn id="12" dur="1" fill="hold">
+                                          <p:stCondLst>
+                                            <p:cond delay="0"/>
+                                          </p:stCondLst>
+                                        </p:cTn>
+                                        <p:tgtEl>
+                                          <p:spTgt spid="3">
+                                            <p:txEl>
+                                              <p:pRg st="1" end="1"/>
+                                            </p:txEl>
+                                          </p:spTgt>
+                                        </p:tgtEl>
+                                        <p:attrNameLst>
+                                          <p:attrName>style.visibility</p:attrName>
+                                        </p:attrNameLst>
+                                      </p:cBhvr>
+                                      <p:to>
+                                        <p:strVal val="visible"/>
+                                      </p:to>
+                                    </p:set>
+                                  </p:childTnLst>
+                                </p:cTn>
+                              </p:par>
+                            </p:childTnLst>
+                          </p:cTn>
+                        </p:par>
+                        <p:par>
+                          <p:cTn id="13" fill="hold">
+                            <p:stCondLst>
+                              <p:cond delay="2000"/>
+                            </p:stCondLst>
+                            <p:childTnLst>
+                              <p:par>
+                                <p:cTn id="14" presetID="2" presetClass="entr" presetSubtype="4" fill="hold" nodeType="afterEffect">
+                                  <p:stCondLst>
+                                    <p:cond delay="2000"/>
+                                  </p:stCondLst>
+                                  <p:childTnLst>
+                                    <p:set>
+                                      <p:cBhvr>
+                                        <p:cTn id="15" dur="1" fill="hold">
+                                          <p:stCondLst>
+                                            <p:cond delay="0"/>
+                                          </p:stCondLst>
+                                        </p:cTn>
+                                        <p:tgtEl>
+                                          <p:spTgt spid="5"/>
+                                        </p:tgtEl>
+                                        <p:attrNameLst>
+                                          <p:attrName>style.visibility</p:attrName>
+                                        </p:attrNameLst>
+                                      </p:cBhvr>
+                                      <p:to>
+                                        <p:strVal val="visible"/>
+                                      </p:to>
+                                    </p:set>
+                                    <p:anim calcmode="lin" valueType="num">
+                                      <p:cBhvr additive="base">
+                                        <p:cTn id="16" dur="500" fill="hold"/>
+                                        <p:tgtEl>
+                                          <p:spTgt spid="5"/>
+                                        </p:tgtEl>
+                                        <p:attrNameLst>
+                                          <p:attrName>ppt_x</p:attrName>
+                                        </p:attrNameLst>
+                                      </p:cBhvr>
+                                      <p:tavLst>
+                                        <p:tav tm="0">
+                                          <p:val>
+                                            <p:strVal val="#ppt_x"/>
+                                          </p:val>
+                                        </p:tav>
+                                        <p:tav tm="100000">
+                                          <p:val>
+                                            <p:strVal val="#ppt_x"/>
+                                          </p:val>
+                                        </p:tav>
+                                      </p:tavLst>
+                                    </p:anim>
+                                    <p:anim calcmode="lin" valueType="num">
+                                      <p:cBhvr additive="base">
+                                        <p:cTn id="17" dur="500" fill="hold"/>
+                                        <p:tgtEl>
+                                          <p:spTgt spid="5"/>
+                                        </p:tgtEl>
+                                        <p:attrNameLst>
+                                          <p:attrName>ppt_y</p:attrName>
+                                        </p:attrNameLst>
+                                      </p:cBhvr>
+                                      <p:tavLst>
+                                        <p:tav tm="0">
+                                          <p:val>
+                                            <p:strVal val="1+#ppt_h/2"/>
+                                          </p:val>
+                                        </p:tav>
+                                        <p:tav tm="100000">
+                                          <p:val>
+                                            <p:strVal val="#ppt_y"/>
+                                          </p:val>
+                                        </p:tav>
+                                      </p:tavLst>
+                                    </p:anim>
+                                  </p:childTnLst>
+                                </p:cTn>
+                              </p:par>
+                            </p:childTnLst>
+                          </p:cTn>
+                        </p:par>
                       </p:childTnLst>
                     </p:cTn>
                   </p:par>
@@ -7418,7 +7184,7 @@
 </p:sld>
 </file>
 
-<file path=ppt/slides/slide5.xml><?xml version="1.0" encoding="utf-8"?>
+<file path=ppt/slides/slide6.xml><?xml version="1.0" encoding="utf-8"?>
 <p:sld xmlns:a="http://schemas.openxmlformats.org/drawingml/2006/main" xmlns:r="http://schemas.openxmlformats.org/officeDocument/2006/relationships" xmlns:p="http://schemas.openxmlformats.org/presentationml/2006/main">
   <p:cSld>
     <p:spTree>
@@ -7501,12 +7267,50 @@
           <a:p>
             <a:r>
               <a:rPr lang="de-AT" dirty="0"/>
-              <a:t>Text</a:t>
+              <a:t>Mit Hilfe von </a:t>
+            </a:r>
+            <a:r>
+              <a:rPr lang="de-AT" dirty="0" err="1"/>
+              <a:t>Window</a:t>
+            </a:r>
+            <a:r>
+              <a:rPr lang="de-AT" dirty="0"/>
+              <a:t>-Funktionen kann man Berechnungen für Abschnitte eines Ergebnisses durchführen</a:t>
             </a:r>
             <a:endParaRPr lang="en-US" dirty="0"/>
           </a:p>
         </p:txBody>
       </p:sp>
+      <p:pic>
+        <p:nvPicPr>
+          <p:cNvPr id="5" name="Grafik 4">
+            <a:extLst>
+              <a:ext uri="{FF2B5EF4-FFF2-40B4-BE49-F238E27FC236}">
+                <a16:creationId xmlns:a16="http://schemas.microsoft.com/office/drawing/2014/main" id="{F530D034-FA5B-7715-1686-3071A7F3D77C}"/>
+              </a:ext>
+            </a:extLst>
+          </p:cNvPr>
+          <p:cNvPicPr>
+            <a:picLocks noChangeAspect="1"/>
+          </p:cNvPicPr>
+          <p:nvPr/>
+        </p:nvPicPr>
+        <p:blipFill>
+          <a:blip r:embed="rId3"/>
+          <a:stretch>
+            <a:fillRect/>
+          </a:stretch>
+        </p:blipFill>
+        <p:spPr>
+          <a:xfrm>
+            <a:off x="255662" y="2990765"/>
+            <a:ext cx="11680675" cy="3186198"/>
+          </a:xfrm>
+          <a:prstGeom prst="rect">
+            <a:avLst/>
+          </a:prstGeom>
+        </p:spPr>
+      </p:pic>
     </p:spTree>
     <p:extLst>
       <p:ext uri="{BB962C8B-B14F-4D97-AF65-F5344CB8AC3E}">
@@ -7622,6 +7426,88 @@
                             </p:childTnLst>
                           </p:cTn>
                         </p:par>
+                        <p:par>
+                          <p:cTn id="10" fill="hold">
+                            <p:stCondLst>
+                              <p:cond delay="1000"/>
+                            </p:stCondLst>
+                            <p:childTnLst>
+                              <p:par>
+                                <p:cTn id="11" presetID="2" presetClass="entr" presetSubtype="4" fill="hold" nodeType="afterEffect">
+                                  <p:stCondLst>
+                                    <p:cond delay="2000"/>
+                                  </p:stCondLst>
+                                  <p:childTnLst>
+                                    <p:set>
+                                      <p:cBhvr>
+                                        <p:cTn id="12" dur="1" fill="hold">
+                                          <p:stCondLst>
+                                            <p:cond delay="0"/>
+                                          </p:stCondLst>
+                                        </p:cTn>
+                                        <p:tgtEl>
+                                          <p:spTgt spid="5"/>
+                                        </p:tgtEl>
+                                        <p:attrNameLst>
+                                          <p:attrName>style.visibility</p:attrName>
+                                        </p:attrNameLst>
+                                      </p:cBhvr>
+                                      <p:to>
+                                        <p:strVal val="visible"/>
+                                      </p:to>
+                                    </p:set>
+                                    <p:anim calcmode="lin" valueType="num">
+                                      <p:cBhvr additive="base">
+                                        <p:cTn id="13" dur="500" fill="hold"/>
+                                        <p:tgtEl>
+                                          <p:spTgt spid="5"/>
+                                        </p:tgtEl>
+                                        <p:attrNameLst>
+                                          <p:attrName>ppt_x</p:attrName>
+                                        </p:attrNameLst>
+                                      </p:cBhvr>
+                                      <p:tavLst>
+                                        <p:tav tm="0">
+                                          <p:val>
+                                            <p:strVal val="#ppt_x"/>
+                                          </p:val>
+                                        </p:tav>
+                                        <p:tav tm="100000">
+                                          <p:val>
+                                            <p:strVal val="#ppt_x"/>
+                                          </p:val>
+                                        </p:tav>
+                                      </p:tavLst>
+                                    </p:anim>
+                                    <p:anim calcmode="lin" valueType="num">
+                                      <p:cBhvr additive="base">
+                                        <p:cTn id="14" dur="500" fill="hold"/>
+                                        <p:tgtEl>
+                                          <p:spTgt spid="5"/>
+                                        </p:tgtEl>
+                                        <p:attrNameLst>
+                                          <p:attrName>ppt_y</p:attrName>
+                                        </p:attrNameLst>
+                                      </p:cBhvr>
+                                      <p:tavLst>
+                                        <p:tav tm="0">
+                                          <p:val>
+                                            <p:strVal val="1+#ppt_h/2"/>
+                                          </p:val>
+                                        </p:tav>
+                                        <p:tav tm="100000">
+                                          <p:val>
+                                            <p:strVal val="#ppt_y"/>
+                                          </p:val>
+                                        </p:tav>
+                                      </p:tavLst>
+                                    </p:anim>
+                                  </p:childTnLst>
+                                </p:cTn>
+                              </p:par>
+                            </p:childTnLst>
+                          </p:cTn>
+                        </p:par>
                       </p:childTnLst>
                     </p:cTn>
                   </p:par>
@@ -7649,6 +7535,310 @@
     <p:bldLst>
       <p:bldP spid="2" grpId="0"/>
       <p:bldP spid="3" grpId="0" build="p"/>
+    </p:bldLst>
+  </p:timing>
+</p:sld>
+</file>
+
+<file path=ppt/slides/slide7.xml><?xml version="1.0" encoding="utf-8"?>
+<p:sld xmlns:a="http://schemas.openxmlformats.org/drawingml/2006/main" xmlns:r="http://schemas.openxmlformats.org/officeDocument/2006/relationships" xmlns:p="http://schemas.openxmlformats.org/presentationml/2006/main">
+  <p:cSld>
+    <p:spTree>
+      <p:nvGrpSpPr>
+        <p:cNvPr id="1" name=""/>
+        <p:cNvGrpSpPr/>
+        <p:nvPr/>
+      </p:nvGrpSpPr>
+      <p:grpSpPr>
+        <a:xfrm>
+          <a:off x="0" y="0"/>
+          <a:ext cx="0" cy="0"/>
+          <a:chOff x="0" y="0"/>
+          <a:chExt cx="0" cy="0"/>
+        </a:xfrm>
+      </p:grpSpPr>
+      <p:sp>
+        <p:nvSpPr>
+          <p:cNvPr id="2" name="Titel 1">
+            <a:extLst>
+              <a:ext uri="{FF2B5EF4-FFF2-40B4-BE49-F238E27FC236}">
+                <a16:creationId xmlns:a16="http://schemas.microsoft.com/office/drawing/2014/main" id="{CF1CD0C8-E427-1663-98E5-F8576744426D}"/>
+              </a:ext>
+            </a:extLst>
+          </p:cNvPr>
+          <p:cNvSpPr>
+            <a:spLocks noGrp="1"/>
+          </p:cNvSpPr>
+          <p:nvPr>
+            <p:ph type="title"/>
+          </p:nvPr>
+        </p:nvSpPr>
+        <p:spPr/>
+        <p:txBody>
+          <a:bodyPr>
+            <a:normAutofit fontScale="90000"/>
+          </a:bodyPr>
+          <a:lstStyle/>
+          <a:p>
+            <a:r>
+              <a:rPr lang="en-US" dirty="0">
+                <a:solidFill>
+                  <a:srgbClr val="000000"/>
+                </a:solidFill>
+                <a:latin typeface="AppleSystemUIFont"/>
+              </a:rPr>
+              <a:t>Window-</a:t>
+            </a:r>
+            <a:r>
+              <a:rPr lang="en-US" dirty="0" err="1">
+                <a:solidFill>
+                  <a:srgbClr val="000000"/>
+                </a:solidFill>
+                <a:latin typeface="AppleSystemUIFont"/>
+              </a:rPr>
+              <a:t>Funktionen</a:t>
+            </a:r>
+            <a:br>
+              <a:rPr lang="en-US" dirty="0">
+                <a:solidFill>
+                  <a:srgbClr val="000000"/>
+                </a:solidFill>
+                <a:latin typeface="AppleSystemUIFont"/>
+              </a:rPr>
+            </a:br>
+            <a:r>
+              <a:rPr lang="en-US" dirty="0">
+                <a:solidFill>
+                  <a:srgbClr val="000000"/>
+                </a:solidFill>
+                <a:latin typeface="AppleSystemUIFont"/>
+              </a:rPr>
+              <a:t> </a:t>
+            </a:r>
+            <a:r>
+              <a:rPr lang="de-AT" dirty="0"/>
+              <a:t>Das führt zum folgenden Ergebnis:</a:t>
+            </a:r>
+            <a:br>
+              <a:rPr lang="de-AT" dirty="0"/>
+            </a:br>
+            <a:endParaRPr lang="en-US" dirty="0"/>
+          </a:p>
+        </p:txBody>
+      </p:sp>
+      <p:pic>
+        <p:nvPicPr>
+          <p:cNvPr id="6" name="Grafik 5">
+            <a:extLst>
+              <a:ext uri="{FF2B5EF4-FFF2-40B4-BE49-F238E27FC236}">
+                <a16:creationId xmlns:a16="http://schemas.microsoft.com/office/drawing/2014/main" id="{024F0B5F-89C8-F22B-6A95-EB8D03AE8D20}"/>
+              </a:ext>
+            </a:extLst>
+          </p:cNvPr>
+          <p:cNvPicPr>
+            <a:picLocks noChangeAspect="1"/>
+          </p:cNvPicPr>
+          <p:nvPr/>
+        </p:nvPicPr>
+        <p:blipFill>
+          <a:blip r:embed="rId3"/>
+          <a:stretch>
+            <a:fillRect/>
+          </a:stretch>
+        </p:blipFill>
+        <p:spPr>
+          <a:xfrm>
+            <a:off x="977347" y="1331333"/>
+            <a:ext cx="10376453" cy="4989917"/>
+          </a:xfrm>
+          <a:prstGeom prst="rect">
+            <a:avLst/>
+          </a:prstGeom>
+        </p:spPr>
+      </p:pic>
+    </p:spTree>
+    <p:extLst>
+      <p:ext uri="{BB962C8B-B14F-4D97-AF65-F5344CB8AC3E}">
+        <p14:creationId xmlns:p14="http://schemas.microsoft.com/office/powerpoint/2010/main" val="3241162369"/>
+      </p:ext>
+    </p:extLst>
+  </p:cSld>
+  <p:clrMapOvr>
+    <a:masterClrMapping/>
+  </p:clrMapOvr>
+  <mc:AlternateContent xmlns:mc="http://schemas.openxmlformats.org/markup-compatibility/2006">
+    <mc:Choice xmlns:p14="http://schemas.microsoft.com/office/powerpoint/2010/main" Requires="p14">
+      <p:transition spd="slow" p14:dur="1500">
+        <p:split orient="vert"/>
+      </p:transition>
+    </mc:Choice>
+    <mc:Fallback>
+      <p:transition spd="slow">
+        <p:split orient="vert"/>
+      </p:transition>
+    </mc:Fallback>
+  </mc:AlternateContent>
+  <p:timing>
+    <p:tnLst>
+      <p:par>
+        <p:cTn id="1" dur="indefinite" restart="never" nodeType="tmRoot">
+          <p:childTnLst>
+            <p:seq concurrent="1" nextAc="seek">
+              <p:cTn id="2" dur="indefinite" nodeType="mainSeq">
+                <p:childTnLst>
+                  <p:par>
+                    <p:cTn id="3" fill="hold">
+                      <p:stCondLst>
+                        <p:cond delay="indefinite"/>
+                        <p:cond evt="onBegin" delay="0">
+                          <p:tn val="2"/>
+                        </p:cond>
+                      </p:stCondLst>
+                      <p:childTnLst>
+                        <p:par>
+                          <p:cTn id="4" fill="hold">
+                            <p:stCondLst>
+                              <p:cond delay="0"/>
+                            </p:stCondLst>
+                            <p:childTnLst>
+                              <p:par>
+                                <p:cTn id="5" presetID="1" presetClass="entr" presetSubtype="0" fill="hold" grpId="0" nodeType="afterEffect">
+                                  <p:stCondLst>
+                                    <p:cond delay="0"/>
+                                  </p:stCondLst>
+                                  <p:childTnLst>
+                                    <p:set>
+                                      <p:cBhvr>
+                                        <p:cTn id="6" dur="1" fill="hold">
+                                          <p:stCondLst>
+                                            <p:cond delay="0"/>
+                                          </p:stCondLst>
+                                        </p:cTn>
+                                        <p:tgtEl>
+                                          <p:spTgt spid="2"/>
+                                        </p:tgtEl>
+                                        <p:attrNameLst>
+                                          <p:attrName>style.visibility</p:attrName>
+                                        </p:attrNameLst>
+                                      </p:cBhvr>
+                                      <p:to>
+                                        <p:strVal val="visible"/>
+                                      </p:to>
+                                    </p:set>
+                                  </p:childTnLst>
+                                </p:cTn>
+                              </p:par>
+                            </p:childTnLst>
+                          </p:cTn>
+                        </p:par>
+                        <p:par>
+                          <p:cTn id="7" fill="hold">
+                            <p:stCondLst>
+                              <p:cond delay="0"/>
+                            </p:stCondLst>
+                            <p:childTnLst>
+                              <p:par>
+                                <p:cTn id="8" presetID="2" presetClass="entr" presetSubtype="4" fill="hold" nodeType="afterEffect">
+                                  <p:stCondLst>
+                                    <p:cond delay="1000"/>
+                                  </p:stCondLst>
+                                  <p:childTnLst>
+                                    <p:set>
+                                      <p:cBhvr>
+                                        <p:cTn id="9" dur="1" fill="hold">
+                                          <p:stCondLst>
+                                            <p:cond delay="0"/>
+                                          </p:stCondLst>
+                                        </p:cTn>
+                                        <p:tgtEl>
+                                          <p:spTgt spid="6"/>
+                                        </p:tgtEl>
+                                        <p:attrNameLst>
+                                          <p:attrName>style.visibility</p:attrName>
+                                        </p:attrNameLst>
+                                      </p:cBhvr>
+                                      <p:to>
+                                        <p:strVal val="visible"/>
+                                      </p:to>
+                                    </p:set>
+                                    <p:anim calcmode="lin" valueType="num">
+                                      <p:cBhvr additive="base">
+                                        <p:cTn id="10" dur="500" fill="hold"/>
+                                        <p:tgtEl>
+                                          <p:spTgt spid="6"/>
+                                        </p:tgtEl>
+                                        <p:attrNameLst>
+                                          <p:attrName>ppt_x</p:attrName>
+                                        </p:attrNameLst>
+                                      </p:cBhvr>
+                                      <p:tavLst>
+                                        <p:tav tm="0">
+                                          <p:val>
+                                            <p:strVal val="#ppt_x"/>
+                                          </p:val>
+                                        </p:tav>
+                                        <p:tav tm="100000">
+                                          <p:val>
+                                            <p:strVal val="#ppt_x"/>
+                                          </p:val>
+                                        </p:tav>
+                                      </p:tavLst>
+                                    </p:anim>
+                                    <p:anim calcmode="lin" valueType="num">
+                                      <p:cBhvr additive="base">
+                                        <p:cTn id="11" dur="500" fill="hold"/>
+                                        <p:tgtEl>
+                                          <p:spTgt spid="6"/>
+                                        </p:tgtEl>
+                                        <p:attrNameLst>
+                                          <p:attrName>ppt_y</p:attrName>
+                                        </p:attrNameLst>
+                                      </p:cBhvr>
+                                      <p:tavLst>
+                                        <p:tav tm="0">
+                                          <p:val>
+                                            <p:strVal val="1+#ppt_h/2"/>
+                                          </p:val>
+                                        </p:tav>
+                                        <p:tav tm="100000">
+                                          <p:val>
+                                            <p:strVal val="#ppt_y"/>
+                                          </p:val>
+                                        </p:tav>
+                                      </p:tavLst>
+                                    </p:anim>
+                                  </p:childTnLst>
+                                </p:cTn>
+                              </p:par>
+                            </p:childTnLst>
+                          </p:cTn>
+                        </p:par>
+                      </p:childTnLst>
+                    </p:cTn>
+                  </p:par>
+                </p:childTnLst>
+              </p:cTn>
+              <p:prevCondLst>
+                <p:cond evt="onPrev" delay="0">
+                  <p:tgtEl>
+                    <p:sldTgt/>
+                  </p:tgtEl>
+                </p:cond>
+              </p:prevCondLst>
+              <p:nextCondLst>
+                <p:cond evt="onNext" delay="0">
+                  <p:tgtEl>
+                    <p:sldTgt/>
+                  </p:tgtEl>
+                </p:cond>
+              </p:nextCondLst>
+            </p:seq>
+          </p:childTnLst>
+        </p:cTn>
+      </p:par>
+    </p:tnLst>
+    <p:bldLst>
+      <p:bldP spid="2" grpId="0"/>
     </p:bldLst>
   </p:timing>
 </p:sld>

</xml_diff>